<commit_message>
Adding How to Cite slide
</commit_message>
<xml_diff>
--- a/docs/simpleitkHistoricalOverview.pptx
+++ b/docs/simpleitkHistoricalOverview.pptx
@@ -5,10 +5,10 @@
     <p:sldMasterId id="2147483708" r:id="rId1"/>
   </p:sldMasterIdLst>
   <p:notesMasterIdLst>
-    <p:notesMasterId r:id="rId14"/>
+    <p:notesMasterId r:id="rId15"/>
   </p:notesMasterIdLst>
   <p:handoutMasterIdLst>
-    <p:handoutMasterId r:id="rId15"/>
+    <p:handoutMasterId r:id="rId16"/>
   </p:handoutMasterIdLst>
   <p:sldIdLst>
     <p:sldId id="484" r:id="rId2"/>
@@ -22,7 +22,8 @@
     <p:sldId id="463" r:id="rId10"/>
     <p:sldId id="469" r:id="rId11"/>
     <p:sldId id="470" r:id="rId12"/>
-    <p:sldId id="486" r:id="rId13"/>
+    <p:sldId id="487" r:id="rId13"/>
+    <p:sldId id="486" r:id="rId14"/>
   </p:sldIdLst>
   <p:sldSz cx="9144000" cy="6858000" type="screen4x3"/>
   <p:notesSz cx="6858000" cy="9144000"/>
@@ -265,7 +266,7 @@
               <a:pPr>
                 <a:defRPr/>
               </a:pPr>
-              <a:t>11/29/17</a:t>
+              <a:t>2/10/18</a:t>
             </a:fld>
             <a:endParaRPr lang="en-US"/>
           </a:p>
@@ -468,7 +469,7 @@
               <a:pPr>
                 <a:defRPr/>
               </a:pPr>
-              <a:t>11/29/17</a:t>
+              <a:t>2/10/18</a:t>
             </a:fld>
             <a:endParaRPr lang="en-US"/>
           </a:p>
@@ -535,38 +536,37 @@
           <a:p>
             <a:pPr lvl="0"/>
             <a:r>
-              <a:rPr lang="en-US" noProof="0" smtClean="0"/>
+              <a:rPr lang="en-US" noProof="0"/>
               <a:t>Click to edit Master text styles</a:t>
             </a:r>
           </a:p>
           <a:p>
             <a:pPr lvl="1"/>
             <a:r>
-              <a:rPr lang="en-US" noProof="0" smtClean="0"/>
+              <a:rPr lang="en-US" noProof="0"/>
               <a:t>Second level</a:t>
             </a:r>
           </a:p>
           <a:p>
             <a:pPr lvl="2"/>
             <a:r>
-              <a:rPr lang="en-US" noProof="0" smtClean="0"/>
+              <a:rPr lang="en-US" noProof="0"/>
               <a:t>Third level</a:t>
             </a:r>
           </a:p>
           <a:p>
             <a:pPr lvl="3"/>
             <a:r>
-              <a:rPr lang="en-US" noProof="0" smtClean="0"/>
+              <a:rPr lang="en-US" noProof="0"/>
               <a:t>Fourth level</a:t>
             </a:r>
           </a:p>
           <a:p>
             <a:pPr lvl="4"/>
             <a:r>
-              <a:rPr lang="en-US" noProof="0" smtClean="0"/>
+              <a:rPr lang="en-US" noProof="0"/>
               <a:t>Fifth level</a:t>
             </a:r>
-            <a:endParaRPr lang="en-US" noProof="0"/>
           </a:p>
         </p:txBody>
       </p:sp>
@@ -839,36 +839,35 @@
           <a:lstStyle/>
           <a:p>
             <a:r>
-              <a:rPr lang="en-US" dirty="0" smtClean="0"/>
+              <a:rPr lang="en-US" dirty="0"/>
               <a:t>Visible human</a:t>
             </a:r>
             <a:r>
-              <a:rPr lang="en-US" baseline="0" dirty="0" smtClean="0"/>
+              <a:rPr lang="en-US" baseline="0" dirty="0"/>
               <a:t> d</a:t>
             </a:r>
             <a:r>
-              <a:rPr lang="en-US" dirty="0" smtClean="0"/>
+              <a:rPr lang="en-US" dirty="0"/>
               <a:t>ata comes in, but we</a:t>
             </a:r>
             <a:r>
-              <a:rPr lang="en-US" baseline="0" dirty="0" smtClean="0"/>
+              <a:rPr lang="en-US" baseline="0" dirty="0"/>
               <a:t> don’t have the tool to analyze it.</a:t>
             </a:r>
           </a:p>
           <a:p>
             <a:r>
-              <a:rPr lang="en-US" dirty="0" smtClean="0"/>
+              <a:rPr lang="en-US" dirty="0"/>
               <a:t>Male dataset</a:t>
             </a:r>
             <a:r>
-              <a:rPr lang="en-US" baseline="0" dirty="0" smtClean="0"/>
+              <a:rPr lang="en-US" baseline="0" dirty="0"/>
               <a:t> </a:t>
             </a:r>
             <a:r>
-              <a:rPr lang="en-US" dirty="0" smtClean="0"/>
+              <a:rPr lang="en-US" dirty="0"/>
               <a:t>released in 1994.</a:t>
             </a:r>
-            <a:endParaRPr lang="en-US" dirty="0"/>
           </a:p>
         </p:txBody>
       </p:sp>
@@ -1049,195 +1048,195 @@
           <a:lstStyle/>
           <a:p>
             <a:r>
-              <a:rPr lang="en-US" dirty="0" smtClean="0"/>
+              <a:rPr lang="en-US" dirty="0"/>
               <a:t>I</a:t>
             </a:r>
             <a:r>
-              <a:rPr lang="en-US" baseline="0" dirty="0" smtClean="0"/>
+              <a:rPr lang="en-US" baseline="0" dirty="0"/>
               <a:t>mage analysis from a cell (GoFigure2) to our planet’s surface (</a:t>
             </a:r>
             <a:r>
-              <a:rPr lang="en-US" baseline="0" dirty="0" err="1" smtClean="0"/>
+              <a:rPr lang="en-US" baseline="0" dirty="0" err="1"/>
               <a:t>Orfeo</a:t>
             </a:r>
             <a:r>
-              <a:rPr lang="en-US" baseline="0" dirty="0" smtClean="0"/>
+              <a:rPr lang="en-US" baseline="0" dirty="0"/>
               <a:t>).</a:t>
             </a:r>
-            <a:endParaRPr lang="en-US" dirty="0" smtClean="0"/>
-          </a:p>
-          <a:p>
-            <a:endParaRPr lang="en-US" dirty="0" smtClean="0"/>
-          </a:p>
-          <a:p>
-            <a:r>
-              <a:rPr lang="en-US" dirty="0" smtClean="0"/>
+            <a:endParaRPr lang="en-US" dirty="0"/>
+          </a:p>
+          <a:p>
+            <a:endParaRPr lang="en-US" dirty="0"/>
+          </a:p>
+          <a:p>
+            <a:r>
+              <a:rPr lang="en-US" dirty="0"/>
               <a:t>http://gofigure2.sourceforge.net/</a:t>
             </a:r>
           </a:p>
           <a:p>
             <a:r>
-              <a:rPr lang="en-US" dirty="0" smtClean="0"/>
+              <a:rPr lang="en-US" dirty="0"/>
               <a:t>http://</a:t>
             </a:r>
             <a:r>
-              <a:rPr lang="en-US" dirty="0" err="1" smtClean="0"/>
+              <a:rPr lang="en-US" dirty="0" err="1"/>
               <a:t>www.slicer.org</a:t>
             </a:r>
             <a:r>
-              <a:rPr lang="en-US" dirty="0" smtClean="0"/>
+              <a:rPr lang="en-US" dirty="0"/>
               <a:t>/</a:t>
             </a:r>
           </a:p>
           <a:p>
             <a:r>
-              <a:rPr lang="en-US" dirty="0" smtClean="0"/>
+              <a:rPr lang="en-US" dirty="0"/>
               <a:t>http://www-</a:t>
             </a:r>
             <a:r>
-              <a:rPr lang="en-US" dirty="0" err="1" smtClean="0"/>
+              <a:rPr lang="en-US" dirty="0" err="1"/>
               <a:t>sop.inria.fr</a:t>
             </a:r>
             <a:r>
-              <a:rPr lang="en-US" dirty="0" smtClean="0"/>
+              <a:rPr lang="en-US" dirty="0"/>
               <a:t>/</a:t>
             </a:r>
             <a:r>
-              <a:rPr lang="en-US" dirty="0" err="1" smtClean="0"/>
+              <a:rPr lang="en-US" dirty="0" err="1"/>
               <a:t>asclepios</a:t>
             </a:r>
             <a:r>
-              <a:rPr lang="en-US" dirty="0" smtClean="0"/>
+              <a:rPr lang="en-US" dirty="0"/>
               <a:t>/</a:t>
             </a:r>
             <a:r>
-              <a:rPr lang="en-US" dirty="0" err="1" smtClean="0"/>
+              <a:rPr lang="en-US" dirty="0" err="1"/>
               <a:t>software.php</a:t>
             </a:r>
-            <a:endParaRPr lang="en-US" dirty="0" smtClean="0"/>
-          </a:p>
-          <a:p>
-            <a:r>
-              <a:rPr lang="en-US" dirty="0" smtClean="0"/>
+            <a:endParaRPr lang="en-US" dirty="0"/>
+          </a:p>
+          <a:p>
+            <a:r>
+              <a:rPr lang="en-US" dirty="0"/>
               <a:t>http://</a:t>
             </a:r>
             <a:r>
-              <a:rPr lang="en-US" dirty="0" err="1" smtClean="0"/>
+              <a:rPr lang="en-US" dirty="0" err="1"/>
               <a:t>www.itksnap.org</a:t>
             </a:r>
             <a:r>
-              <a:rPr lang="en-US" dirty="0" smtClean="0"/>
+              <a:rPr lang="en-US" dirty="0"/>
               <a:t>/</a:t>
             </a:r>
           </a:p>
           <a:p>
             <a:r>
-              <a:rPr lang="en-US" dirty="0" smtClean="0"/>
+              <a:rPr lang="en-US" dirty="0"/>
               <a:t>http://</a:t>
             </a:r>
             <a:r>
-              <a:rPr lang="en-US" dirty="0" err="1" smtClean="0"/>
+              <a:rPr lang="en-US" dirty="0" err="1"/>
               <a:t>www.bioimagexd.net</a:t>
             </a:r>
             <a:r>
-              <a:rPr lang="en-US" dirty="0" smtClean="0"/>
+              <a:rPr lang="en-US" dirty="0"/>
               <a:t>/</a:t>
             </a:r>
           </a:p>
           <a:p>
             <a:r>
-              <a:rPr lang="en-US" dirty="0" smtClean="0"/>
+              <a:rPr lang="en-US" dirty="0"/>
               <a:t>http://co-</a:t>
             </a:r>
             <a:r>
-              <a:rPr lang="en-US" dirty="0" err="1" smtClean="0"/>
+              <a:rPr lang="en-US" dirty="0" err="1"/>
               <a:t>me.ch</a:t>
             </a:r>
             <a:r>
-              <a:rPr lang="en-US" dirty="0" smtClean="0"/>
+              <a:rPr lang="en-US" dirty="0"/>
               <a:t>/internal/</a:t>
             </a:r>
             <a:r>
-              <a:rPr lang="en-US" dirty="0" err="1" smtClean="0"/>
+              <a:rPr lang="en-US" dirty="0" err="1"/>
               <a:t>marvin</a:t>
             </a:r>
             <a:r>
-              <a:rPr lang="en-US" dirty="0" smtClean="0"/>
+              <a:rPr lang="en-US" dirty="0"/>
               <a:t>/</a:t>
             </a:r>
             <a:r>
-              <a:rPr lang="en-US" dirty="0" err="1" smtClean="0"/>
+              <a:rPr lang="en-US" dirty="0" err="1"/>
               <a:t>index.en.html</a:t>
             </a:r>
-            <a:endParaRPr lang="en-US" dirty="0" smtClean="0"/>
-          </a:p>
-          <a:p>
-            <a:r>
-              <a:rPr lang="en-US" dirty="0" smtClean="0"/>
+            <a:endParaRPr lang="en-US" dirty="0"/>
+          </a:p>
+          <a:p>
+            <a:r>
+              <a:rPr lang="en-US" dirty="0"/>
               <a:t>http://</a:t>
             </a:r>
             <a:r>
-              <a:rPr lang="en-US" dirty="0" err="1" smtClean="0"/>
+              <a:rPr lang="en-US" dirty="0" err="1"/>
               <a:t>www.osirix-viewer.com</a:t>
             </a:r>
             <a:r>
-              <a:rPr lang="en-US" dirty="0" smtClean="0"/>
+              <a:rPr lang="en-US" dirty="0"/>
               <a:t>/</a:t>
             </a:r>
           </a:p>
           <a:p>
             <a:r>
-              <a:rPr lang="en-US" dirty="0" smtClean="0"/>
+              <a:rPr lang="en-US" dirty="0"/>
               <a:t>http://</a:t>
             </a:r>
             <a:r>
-              <a:rPr lang="en-US" dirty="0" err="1" smtClean="0"/>
+              <a:rPr lang="en-US" dirty="0" err="1"/>
               <a:t>www.analyzedirect.com</a:t>
             </a:r>
             <a:r>
-              <a:rPr lang="en-US" dirty="0" smtClean="0"/>
+              <a:rPr lang="en-US" dirty="0"/>
               <a:t>/</a:t>
             </a:r>
           </a:p>
           <a:p>
             <a:r>
-              <a:rPr lang="en-US" dirty="0" smtClean="0"/>
+              <a:rPr lang="en-US" dirty="0"/>
               <a:t>http://</a:t>
             </a:r>
             <a:r>
-              <a:rPr lang="en-US" dirty="0" err="1" smtClean="0"/>
+              <a:rPr lang="en-US" dirty="0" err="1"/>
               <a:t>www.mitk.org</a:t>
             </a:r>
             <a:r>
-              <a:rPr lang="en-US" dirty="0" smtClean="0"/>
+              <a:rPr lang="en-US" dirty="0"/>
               <a:t>/</a:t>
             </a:r>
           </a:p>
           <a:p>
             <a:r>
-              <a:rPr lang="en-US" dirty="0" smtClean="0"/>
+              <a:rPr lang="en-US" dirty="0"/>
               <a:t>http://</a:t>
             </a:r>
             <a:r>
-              <a:rPr lang="en-US" dirty="0" err="1" smtClean="0"/>
+              <a:rPr lang="en-US" dirty="0" err="1"/>
               <a:t>elastix.isi.uu.nl</a:t>
             </a:r>
             <a:r>
-              <a:rPr lang="en-US" dirty="0" smtClean="0"/>
+              <a:rPr lang="en-US" dirty="0"/>
               <a:t>/</a:t>
             </a:r>
           </a:p>
           <a:p>
             <a:r>
-              <a:rPr lang="en-US" dirty="0" smtClean="0"/>
+              <a:rPr lang="en-US" dirty="0"/>
               <a:t>http://</a:t>
             </a:r>
             <a:r>
-              <a:rPr lang="en-US" dirty="0" err="1" smtClean="0"/>
+              <a:rPr lang="en-US" dirty="0" err="1"/>
               <a:t>www.igstk.org</a:t>
             </a:r>
             <a:r>
-              <a:rPr lang="en-US" dirty="0" smtClean="0"/>
+              <a:rPr lang="en-US" dirty="0"/>
               <a:t>/</a:t>
             </a:r>
           </a:p>
@@ -1333,11 +1332,11 @@
           <a:lstStyle/>
           <a:p>
             <a:r>
-              <a:rPr lang="en-US" dirty="0" smtClean="0"/>
+              <a:rPr lang="en-US" dirty="0"/>
               <a:t>These companies</a:t>
             </a:r>
             <a:r>
-              <a:rPr lang="en-US" baseline="0" dirty="0" smtClean="0"/>
+              <a:rPr lang="en-US" baseline="0" dirty="0"/>
               <a:t> likely use ITK but we have no sure way of knowing.</a:t>
             </a:r>
             <a:endParaRPr lang="en-US" dirty="0"/>
@@ -1448,7 +1447,7 @@
               <a:defRPr/>
             </a:pPr>
             <a:r>
-              <a:rPr lang="en-US" sz="1200" kern="1200" dirty="0" smtClean="0">
+              <a:rPr lang="en-US" sz="1200" kern="1200" dirty="0">
                 <a:solidFill>
                   <a:schemeClr val="tx1"/>
                 </a:solidFill>
@@ -1460,7 +1459,7 @@
               <a:t>List all tags: </a:t>
             </a:r>
             <a:r>
-              <a:rPr lang="en-US" sz="1200" kern="1200" dirty="0" err="1" smtClean="0">
+              <a:rPr lang="en-US" sz="1200" kern="1200" dirty="0" err="1">
                 <a:solidFill>
                   <a:schemeClr val="tx1"/>
                 </a:solidFill>
@@ -1472,7 +1471,7 @@
               <a:t>git</a:t>
             </a:r>
             <a:r>
-              <a:rPr lang="en-US" sz="1200" kern="1200" dirty="0" smtClean="0">
+              <a:rPr lang="en-US" sz="1200" kern="1200" dirty="0">
                 <a:solidFill>
                   <a:schemeClr val="tx1"/>
                 </a:solidFill>
@@ -1503,7 +1502,7 @@
               <a:defRPr/>
             </a:pPr>
             <a:r>
-              <a:rPr lang="en-US" sz="1200" kern="1200" dirty="0" smtClean="0">
+              <a:rPr lang="en-US" sz="1200" kern="1200" dirty="0">
                 <a:solidFill>
                   <a:schemeClr val="tx1"/>
                 </a:solidFill>
@@ -1515,7 +1514,7 @@
               <a:t>Number of commits in repo: </a:t>
             </a:r>
             <a:r>
-              <a:rPr lang="en-US" sz="1200" kern="1200" dirty="0" err="1" smtClean="0">
+              <a:rPr lang="en-US" sz="1200" kern="1200" dirty="0" err="1">
                 <a:solidFill>
                   <a:schemeClr val="tx1"/>
                 </a:solidFill>
@@ -1527,7 +1526,7 @@
               <a:t>git</a:t>
             </a:r>
             <a:r>
-              <a:rPr lang="en-US" sz="1200" kern="1200" dirty="0" smtClean="0">
+              <a:rPr lang="en-US" sz="1200" kern="1200" dirty="0">
                 <a:solidFill>
                   <a:schemeClr val="tx1"/>
                 </a:solidFill>
@@ -1558,31 +1557,31 @@
               <a:defRPr/>
             </a:pPr>
             <a:r>
-              <a:rPr lang="cs-CZ" dirty="0" err="1" smtClean="0"/>
+              <a:rPr lang="cs-CZ" dirty="0" err="1"/>
               <a:t>Number</a:t>
             </a:r>
             <a:r>
-              <a:rPr lang="cs-CZ" baseline="0" dirty="0" smtClean="0"/>
+              <a:rPr lang="cs-CZ" baseline="0" dirty="0"/>
               <a:t> </a:t>
             </a:r>
             <a:r>
-              <a:rPr lang="cs-CZ" dirty="0" err="1" smtClean="0"/>
+              <a:rPr lang="cs-CZ" dirty="0" err="1"/>
               <a:t>of</a:t>
             </a:r>
             <a:r>
-              <a:rPr lang="cs-CZ" dirty="0" smtClean="0"/>
+              <a:rPr lang="cs-CZ" dirty="0"/>
               <a:t> </a:t>
             </a:r>
             <a:r>
-              <a:rPr lang="cs-CZ" dirty="0" err="1" smtClean="0"/>
+              <a:rPr lang="cs-CZ" dirty="0" err="1"/>
               <a:t>contributors</a:t>
             </a:r>
             <a:r>
-              <a:rPr lang="cs-CZ" baseline="0" dirty="0" smtClean="0"/>
+              <a:rPr lang="cs-CZ" baseline="0" dirty="0"/>
               <a:t>: </a:t>
             </a:r>
             <a:r>
-              <a:rPr lang="cs-CZ" sz="1200" kern="1200" dirty="0" err="1" smtClean="0">
+              <a:rPr lang="cs-CZ" sz="1200" kern="1200" dirty="0" err="1">
                 <a:solidFill>
                   <a:schemeClr val="tx1"/>
                 </a:solidFill>
@@ -1594,7 +1593,7 @@
               <a:t>git</a:t>
             </a:r>
             <a:r>
-              <a:rPr lang="cs-CZ" sz="1200" kern="1200" dirty="0" smtClean="0">
+              <a:rPr lang="cs-CZ" sz="1200" kern="1200" dirty="0">
                 <a:solidFill>
                   <a:schemeClr val="tx1"/>
                 </a:solidFill>
@@ -1606,7 +1605,7 @@
               <a:t> log --</a:t>
             </a:r>
             <a:r>
-              <a:rPr lang="cs-CZ" sz="1200" kern="1200" dirty="0" err="1" smtClean="0">
+              <a:rPr lang="cs-CZ" sz="1200" kern="1200" dirty="0" err="1">
                 <a:solidFill>
                   <a:schemeClr val="tx1"/>
                 </a:solidFill>
@@ -1618,7 +1617,7 @@
               <a:t>format</a:t>
             </a:r>
             <a:r>
-              <a:rPr lang="cs-CZ" sz="1200" kern="1200" dirty="0" smtClean="0">
+              <a:rPr lang="cs-CZ" sz="1200" kern="1200" dirty="0">
                 <a:solidFill>
                   <a:schemeClr val="tx1"/>
                 </a:solidFill>
@@ -1630,7 +1629,7 @@
               <a:t>='%</a:t>
             </a:r>
             <a:r>
-              <a:rPr lang="cs-CZ" sz="1200" kern="1200" dirty="0" err="1" smtClean="0">
+              <a:rPr lang="cs-CZ" sz="1200" kern="1200" dirty="0" err="1">
                 <a:solidFill>
                   <a:schemeClr val="tx1"/>
                 </a:solidFill>
@@ -1642,7 +1641,7 @@
               <a:t>aN</a:t>
             </a:r>
             <a:r>
-              <a:rPr lang="cs-CZ" sz="1200" kern="1200" dirty="0" smtClean="0">
+              <a:rPr lang="cs-CZ" sz="1200" kern="1200" dirty="0">
                 <a:solidFill>
                   <a:schemeClr val="tx1"/>
                 </a:solidFill>
@@ -1654,7 +1653,7 @@
               <a:t>' | sort -u -k2; </a:t>
             </a:r>
             <a:r>
-              <a:rPr lang="cs-CZ" sz="1200" kern="1200" dirty="0" err="1" smtClean="0">
+              <a:rPr lang="cs-CZ" sz="1200" kern="1200" dirty="0" err="1">
                 <a:solidFill>
                   <a:schemeClr val="tx1"/>
                 </a:solidFill>
@@ -1666,7 +1665,7 @@
               <a:t>then</a:t>
             </a:r>
             <a:r>
-              <a:rPr lang="cs-CZ" sz="1200" kern="1200" dirty="0" smtClean="0">
+              <a:rPr lang="cs-CZ" sz="1200" kern="1200" dirty="0">
                 <a:solidFill>
                   <a:schemeClr val="tx1"/>
                 </a:solidFill>
@@ -1678,7 +1677,7 @@
               <a:t> </a:t>
             </a:r>
             <a:r>
-              <a:rPr lang="cs-CZ" sz="1200" kern="1200" dirty="0" err="1" smtClean="0">
+              <a:rPr lang="cs-CZ" sz="1200" kern="1200" dirty="0" err="1">
                 <a:solidFill>
                   <a:schemeClr val="tx1"/>
                 </a:solidFill>
@@ -1690,7 +1689,7 @@
               <a:t>count</a:t>
             </a:r>
             <a:r>
-              <a:rPr lang="cs-CZ" sz="1200" kern="1200" dirty="0" smtClean="0">
+              <a:rPr lang="cs-CZ" sz="1200" kern="1200" dirty="0">
                 <a:solidFill>
                   <a:schemeClr val="tx1"/>
                 </a:solidFill>
@@ -1702,7 +1701,7 @@
               <a:t> and </a:t>
             </a:r>
             <a:r>
-              <a:rPr lang="cs-CZ" sz="1200" kern="1200" dirty="0" err="1" smtClean="0">
+              <a:rPr lang="cs-CZ" sz="1200" kern="1200" dirty="0" err="1">
                 <a:solidFill>
                   <a:schemeClr val="tx1"/>
                 </a:solidFill>
@@ -1714,7 +1713,7 @@
               <a:t>remove</a:t>
             </a:r>
             <a:r>
-              <a:rPr lang="cs-CZ" sz="1200" kern="1200" dirty="0" smtClean="0">
+              <a:rPr lang="cs-CZ" sz="1200" kern="1200" dirty="0">
                 <a:solidFill>
                   <a:schemeClr val="tx1"/>
                 </a:solidFill>
@@ -1726,7 +1725,7 @@
               <a:t> </a:t>
             </a:r>
             <a:r>
-              <a:rPr lang="cs-CZ" sz="1200" kern="1200" dirty="0" err="1" smtClean="0">
+              <a:rPr lang="cs-CZ" sz="1200" kern="1200" dirty="0" err="1">
                 <a:solidFill>
                   <a:schemeClr val="tx1"/>
                 </a:solidFill>
@@ -1738,7 +1737,7 @@
               <a:t>people</a:t>
             </a:r>
             <a:r>
-              <a:rPr lang="cs-CZ" sz="1200" kern="1200" dirty="0" smtClean="0">
+              <a:rPr lang="cs-CZ" sz="1200" kern="1200" dirty="0">
                 <a:solidFill>
                   <a:schemeClr val="tx1"/>
                 </a:solidFill>
@@ -1750,7 +1749,7 @@
               <a:t> </a:t>
             </a:r>
             <a:r>
-              <a:rPr lang="cs-CZ" sz="1200" kern="1200" dirty="0" err="1" smtClean="0">
+              <a:rPr lang="cs-CZ" sz="1200" kern="1200" dirty="0" err="1">
                 <a:solidFill>
                   <a:schemeClr val="tx1"/>
                 </a:solidFill>
@@ -1762,7 +1761,7 @@
               <a:t>with</a:t>
             </a:r>
             <a:r>
-              <a:rPr lang="cs-CZ" sz="1200" kern="1200" dirty="0" smtClean="0">
+              <a:rPr lang="cs-CZ" sz="1200" kern="1200" dirty="0">
                 <a:solidFill>
                   <a:schemeClr val="tx1"/>
                 </a:solidFill>
@@ -1774,7 +1773,7 @@
               <a:t> </a:t>
             </a:r>
             <a:r>
-              <a:rPr lang="cs-CZ" sz="1200" kern="1200" dirty="0" err="1" smtClean="0">
+              <a:rPr lang="cs-CZ" sz="1200" kern="1200" dirty="0" err="1">
                 <a:solidFill>
                   <a:schemeClr val="tx1"/>
                 </a:solidFill>
@@ -1786,7 +1785,7 @@
               <a:t>multiple</a:t>
             </a:r>
             <a:r>
-              <a:rPr lang="cs-CZ" sz="1200" kern="1200" baseline="0" dirty="0" smtClean="0">
+              <a:rPr lang="cs-CZ" sz="1200" kern="1200" baseline="0" dirty="0">
                 <a:solidFill>
                   <a:schemeClr val="tx1"/>
                 </a:solidFill>
@@ -1798,7 +1797,7 @@
               <a:t> </a:t>
             </a:r>
             <a:r>
-              <a:rPr lang="cs-CZ" sz="1200" kern="1200" baseline="0" dirty="0" err="1" smtClean="0">
+              <a:rPr lang="cs-CZ" sz="1200" kern="1200" baseline="0" dirty="0" err="1">
                 <a:solidFill>
                   <a:schemeClr val="tx1"/>
                 </a:solidFill>
@@ -1810,7 +1809,7 @@
               <a:t>appearances</a:t>
             </a:r>
             <a:r>
-              <a:rPr lang="cs-CZ" sz="1200" kern="1200" baseline="0" dirty="0" smtClean="0">
+              <a:rPr lang="cs-CZ" sz="1200" kern="1200" baseline="0" dirty="0">
                 <a:solidFill>
                   <a:schemeClr val="tx1"/>
                 </a:solidFill>
@@ -1822,7 +1821,7 @@
               <a:t> (Dave </a:t>
             </a:r>
             <a:r>
-              <a:rPr lang="cs-CZ" sz="1200" kern="1200" baseline="0" dirty="0" err="1" smtClean="0">
+              <a:rPr lang="cs-CZ" sz="1200" kern="1200" baseline="0" dirty="0" err="1">
                 <a:solidFill>
                   <a:schemeClr val="tx1"/>
                 </a:solidFill>
@@ -1834,7 +1833,7 @@
               <a:t>Chen</a:t>
             </a:r>
             <a:r>
-              <a:rPr lang="cs-CZ" sz="1200" kern="1200" baseline="0" dirty="0" smtClean="0">
+              <a:rPr lang="cs-CZ" sz="1200" kern="1200" baseline="0" dirty="0">
                 <a:solidFill>
                   <a:schemeClr val="tx1"/>
                 </a:solidFill>
@@ -1846,7 +1845,7 @@
               <a:t>, David T. </a:t>
             </a:r>
             <a:r>
-              <a:rPr lang="cs-CZ" sz="1200" kern="1200" baseline="0" dirty="0" err="1" smtClean="0">
+              <a:rPr lang="cs-CZ" sz="1200" kern="1200" baseline="0" dirty="0" err="1">
                 <a:solidFill>
                   <a:schemeClr val="tx1"/>
                 </a:solidFill>
@@ -1858,7 +1857,7 @@
               <a:t>Chen</a:t>
             </a:r>
             <a:r>
-              <a:rPr lang="is-IS" sz="1200" kern="1200" baseline="0" dirty="0" smtClean="0">
+              <a:rPr lang="is-IS" sz="1200" kern="1200" baseline="0" dirty="0">
                 <a:solidFill>
                   <a:schemeClr val="tx1"/>
                 </a:solidFill>
@@ -1870,7 +1869,7 @@
               <a:t>…</a:t>
             </a:r>
             <a:r>
-              <a:rPr lang="cs-CZ" sz="1200" kern="1200" baseline="0" dirty="0" smtClean="0">
+              <a:rPr lang="cs-CZ" sz="1200" kern="1200" baseline="0" dirty="0">
                 <a:solidFill>
                   <a:schemeClr val="tx1"/>
                 </a:solidFill>
@@ -1881,7 +1880,7 @@
               </a:rPr>
               <a:t>)</a:t>
             </a:r>
-            <a:endParaRPr lang="cs-CZ" sz="1200" kern="1200" dirty="0" smtClean="0">
+            <a:endParaRPr lang="cs-CZ" sz="1200" kern="1200" dirty="0">
               <a:solidFill>
                 <a:schemeClr val="tx1"/>
               </a:solidFill>
@@ -1892,67 +1891,67 @@
             </a:endParaRPr>
           </a:p>
           <a:p>
-            <a:endParaRPr lang="cs-CZ" dirty="0" smtClean="0"/>
-          </a:p>
-          <a:p>
-            <a:r>
-              <a:rPr lang="cs-CZ" dirty="0" smtClean="0"/>
+            <a:endParaRPr lang="cs-CZ" dirty="0"/>
+          </a:p>
+          <a:p>
+            <a:r>
+              <a:rPr lang="cs-CZ" dirty="0"/>
               <a:t>11,156 </a:t>
             </a:r>
             <a:r>
-              <a:rPr lang="cs-CZ" dirty="0" err="1" smtClean="0"/>
+              <a:rPr lang="cs-CZ" dirty="0" err="1"/>
               <a:t>downloads</a:t>
             </a:r>
             <a:r>
-              <a:rPr lang="cs-CZ" dirty="0" smtClean="0"/>
+              <a:rPr lang="cs-CZ" dirty="0"/>
               <a:t> </a:t>
             </a:r>
             <a:r>
-              <a:rPr lang="cs-CZ" dirty="0" err="1" smtClean="0"/>
+              <a:rPr lang="cs-CZ" dirty="0" err="1"/>
               <a:t>from</a:t>
             </a:r>
             <a:r>
-              <a:rPr lang="cs-CZ" dirty="0" smtClean="0"/>
+              <a:rPr lang="cs-CZ" dirty="0"/>
               <a:t> </a:t>
             </a:r>
             <a:r>
-              <a:rPr lang="cs-CZ" dirty="0" err="1" smtClean="0"/>
+              <a:rPr lang="cs-CZ" dirty="0" err="1"/>
               <a:t>Anaconda</a:t>
             </a:r>
             <a:r>
-              <a:rPr lang="cs-CZ" dirty="0" smtClean="0"/>
+              <a:rPr lang="cs-CZ" dirty="0"/>
               <a:t> </a:t>
             </a:r>
             <a:r>
-              <a:rPr lang="cs-CZ" dirty="0" err="1" smtClean="0"/>
+              <a:rPr lang="cs-CZ" dirty="0" err="1"/>
               <a:t>cloud</a:t>
             </a:r>
-            <a:endParaRPr lang="cs-CZ" dirty="0" smtClean="0"/>
-          </a:p>
-          <a:p>
-            <a:r>
-              <a:rPr lang="fi-FI" dirty="0" smtClean="0"/>
+            <a:endParaRPr lang="cs-CZ" dirty="0"/>
+          </a:p>
+          <a:p>
+            <a:r>
+              <a:rPr lang="fi-FI" dirty="0"/>
               <a:t>18286</a:t>
             </a:r>
             <a:r>
-              <a:rPr lang="is-IS" dirty="0" smtClean="0"/>
+              <a:rPr lang="is-IS" dirty="0"/>
               <a:t> downloads from PyPI (till it stopped recording in Feb. 2016). </a:t>
             </a:r>
           </a:p>
           <a:p>
             <a:r>
-              <a:rPr lang="uk-UA" b="0" dirty="0" smtClean="0"/>
+              <a:rPr lang="uk-UA" b="0" dirty="0"/>
               <a:t>39,435</a:t>
             </a:r>
             <a:r>
-              <a:rPr lang="en-US" b="0" dirty="0" smtClean="0"/>
+              <a:rPr lang="en-US" b="0" dirty="0"/>
               <a:t> downloads from </a:t>
             </a:r>
             <a:r>
-              <a:rPr lang="en-US" b="0" dirty="0" err="1" smtClean="0"/>
+              <a:rPr lang="en-US" b="0" dirty="0" err="1"/>
               <a:t>sourceforge</a:t>
             </a:r>
-            <a:endParaRPr lang="en-US" b="0" dirty="0" smtClean="0"/>
+            <a:endParaRPr lang="en-US" b="0" dirty="0"/>
           </a:p>
           <a:p>
             <a:endParaRPr lang="en-US" dirty="0"/>
@@ -2039,10 +2038,9 @@
           <a:lstStyle/>
           <a:p>
             <a:r>
-              <a:rPr lang="en-US" dirty="0" smtClean="0"/>
+              <a:rPr lang="en-US" dirty="0"/>
               <a:t>Click to edit Master title style</a:t>
             </a:r>
-            <a:endParaRPr lang="en-US" dirty="0"/>
           </a:p>
         </p:txBody>
       </p:sp>
@@ -2158,10 +2156,9 @@
           </a:lstStyle>
           <a:p>
             <a:r>
-              <a:rPr lang="en-US" dirty="0" smtClean="0"/>
+              <a:rPr lang="en-US" dirty="0"/>
               <a:t>Click to edit Master subtitle style</a:t>
             </a:r>
-            <a:endParaRPr lang="en-US" dirty="0"/>
           </a:p>
         </p:txBody>
       </p:sp>
@@ -2192,7 +2189,7 @@
               <a:pPr>
                 <a:defRPr/>
               </a:pPr>
-              <a:t>11/29/17</a:t>
+              <a:t>2/10/18</a:t>
             </a:fld>
             <a:endParaRPr lang="en-US"/>
           </a:p>
@@ -2303,10 +2300,9 @@
           <a:lstStyle/>
           <a:p>
             <a:r>
-              <a:rPr lang="en-US" smtClean="0"/>
+              <a:rPr lang="en-US"/>
               <a:t>Click to edit Master title style</a:t>
             </a:r>
-            <a:endParaRPr lang="en-US"/>
           </a:p>
         </p:txBody>
       </p:sp>
@@ -2327,38 +2323,37 @@
           <a:p>
             <a:pPr lvl="0"/>
             <a:r>
-              <a:rPr lang="en-US" smtClean="0"/>
+              <a:rPr lang="en-US"/>
               <a:t>Click to edit Master text styles</a:t>
             </a:r>
           </a:p>
           <a:p>
             <a:pPr lvl="1"/>
             <a:r>
-              <a:rPr lang="en-US" smtClean="0"/>
+              <a:rPr lang="en-US"/>
               <a:t>Second level</a:t>
             </a:r>
           </a:p>
           <a:p>
             <a:pPr lvl="2"/>
             <a:r>
-              <a:rPr lang="en-US" smtClean="0"/>
+              <a:rPr lang="en-US"/>
               <a:t>Third level</a:t>
             </a:r>
           </a:p>
           <a:p>
             <a:pPr lvl="3"/>
             <a:r>
-              <a:rPr lang="en-US" smtClean="0"/>
+              <a:rPr lang="en-US"/>
               <a:t>Fourth level</a:t>
             </a:r>
           </a:p>
           <a:p>
             <a:pPr lvl="4"/>
             <a:r>
-              <a:rPr lang="en-US" smtClean="0"/>
+              <a:rPr lang="en-US"/>
               <a:t>Fifth level</a:t>
             </a:r>
-            <a:endParaRPr lang="en-US"/>
           </a:p>
         </p:txBody>
       </p:sp>
@@ -2389,7 +2384,7 @@
               <a:pPr>
                 <a:defRPr/>
               </a:pPr>
-              <a:t>11/29/17</a:t>
+              <a:t>2/10/18</a:t>
             </a:fld>
             <a:endParaRPr lang="en-US"/>
           </a:p>
@@ -2505,10 +2500,9 @@
           <a:lstStyle/>
           <a:p>
             <a:r>
-              <a:rPr lang="en-US" smtClean="0"/>
+              <a:rPr lang="en-US"/>
               <a:t>Click to edit Master title style</a:t>
             </a:r>
-            <a:endParaRPr lang="en-US"/>
           </a:p>
         </p:txBody>
       </p:sp>
@@ -2534,38 +2528,37 @@
           <a:p>
             <a:pPr lvl="0"/>
             <a:r>
-              <a:rPr lang="en-US" smtClean="0"/>
+              <a:rPr lang="en-US"/>
               <a:t>Click to edit Master text styles</a:t>
             </a:r>
           </a:p>
           <a:p>
             <a:pPr lvl="1"/>
             <a:r>
-              <a:rPr lang="en-US" smtClean="0"/>
+              <a:rPr lang="en-US"/>
               <a:t>Second level</a:t>
             </a:r>
           </a:p>
           <a:p>
             <a:pPr lvl="2"/>
             <a:r>
-              <a:rPr lang="en-US" smtClean="0"/>
+              <a:rPr lang="en-US"/>
               <a:t>Third level</a:t>
             </a:r>
           </a:p>
           <a:p>
             <a:pPr lvl="3"/>
             <a:r>
-              <a:rPr lang="en-US" smtClean="0"/>
+              <a:rPr lang="en-US"/>
               <a:t>Fourth level</a:t>
             </a:r>
           </a:p>
           <a:p>
             <a:pPr lvl="4"/>
             <a:r>
-              <a:rPr lang="en-US" smtClean="0"/>
+              <a:rPr lang="en-US"/>
               <a:t>Fifth level</a:t>
             </a:r>
-            <a:endParaRPr lang="en-US"/>
           </a:p>
         </p:txBody>
       </p:sp>
@@ -2596,7 +2589,7 @@
               <a:pPr>
                 <a:defRPr/>
               </a:pPr>
-              <a:t>11/29/17</a:t>
+              <a:t>2/10/18</a:t>
             </a:fld>
             <a:endParaRPr lang="en-US"/>
           </a:p>
@@ -2776,10 +2769,9 @@
           <a:lstStyle/>
           <a:p>
             <a:r>
-              <a:rPr lang="en-US" dirty="0" smtClean="0"/>
+              <a:rPr lang="en-US" dirty="0"/>
               <a:t>Click to edit Master title style</a:t>
             </a:r>
-            <a:endParaRPr lang="en-US" dirty="0"/>
           </a:p>
         </p:txBody>
       </p:sp>
@@ -2800,38 +2792,37 @@
           <a:p>
             <a:pPr lvl="0"/>
             <a:r>
-              <a:rPr lang="en-US" smtClean="0"/>
+              <a:rPr lang="en-US"/>
               <a:t>Click to edit Master text styles</a:t>
             </a:r>
           </a:p>
           <a:p>
             <a:pPr lvl="1"/>
             <a:r>
-              <a:rPr lang="en-US" smtClean="0"/>
+              <a:rPr lang="en-US"/>
               <a:t>Second level</a:t>
             </a:r>
           </a:p>
           <a:p>
             <a:pPr lvl="2"/>
             <a:r>
-              <a:rPr lang="en-US" smtClean="0"/>
+              <a:rPr lang="en-US"/>
               <a:t>Third level</a:t>
             </a:r>
           </a:p>
           <a:p>
             <a:pPr lvl="3"/>
             <a:r>
-              <a:rPr lang="en-US" smtClean="0"/>
+              <a:rPr lang="en-US"/>
               <a:t>Fourth level</a:t>
             </a:r>
           </a:p>
           <a:p>
             <a:pPr lvl="4"/>
             <a:r>
-              <a:rPr lang="en-US" smtClean="0"/>
+              <a:rPr lang="en-US"/>
               <a:t>Fifth level</a:t>
             </a:r>
-            <a:endParaRPr lang="en-US"/>
           </a:p>
         </p:txBody>
       </p:sp>
@@ -2862,7 +2853,7 @@
               <a:pPr>
                 <a:defRPr/>
               </a:pPr>
-              <a:t>11/29/17</a:t>
+              <a:t>2/10/18</a:t>
             </a:fld>
             <a:endParaRPr lang="en-US"/>
           </a:p>
@@ -2982,10 +2973,9 @@
           </a:lstStyle>
           <a:p>
             <a:r>
-              <a:rPr lang="en-US" dirty="0" smtClean="0"/>
+              <a:rPr lang="en-US" dirty="0"/>
               <a:t>Click to edit Master title style</a:t>
             </a:r>
-            <a:endParaRPr lang="en-US" dirty="0"/>
           </a:p>
         </p:txBody>
       </p:sp>
@@ -3102,7 +3092,7 @@
           <a:p>
             <a:pPr lvl="0"/>
             <a:r>
-              <a:rPr lang="en-US" smtClean="0"/>
+              <a:rPr lang="en-US"/>
               <a:t>Click to edit Master text styles</a:t>
             </a:r>
           </a:p>
@@ -3135,7 +3125,7 @@
               <a:pPr>
                 <a:defRPr/>
               </a:pPr>
-              <a:t>11/29/17</a:t>
+              <a:t>2/10/18</a:t>
             </a:fld>
             <a:endParaRPr lang="en-US"/>
           </a:p>
@@ -3315,10 +3305,9 @@
           <a:lstStyle/>
           <a:p>
             <a:r>
-              <a:rPr lang="en-US" dirty="0" smtClean="0"/>
+              <a:rPr lang="en-US" dirty="0"/>
               <a:t>Click to edit Master title style</a:t>
             </a:r>
-            <a:endParaRPr lang="en-US" dirty="0"/>
           </a:p>
         </p:txBody>
       </p:sp>
@@ -3372,38 +3361,37 @@
           <a:p>
             <a:pPr lvl="0"/>
             <a:r>
-              <a:rPr lang="en-US" smtClean="0"/>
+              <a:rPr lang="en-US"/>
               <a:t>Click to edit Master text styles</a:t>
             </a:r>
           </a:p>
           <a:p>
             <a:pPr lvl="1"/>
             <a:r>
-              <a:rPr lang="en-US" smtClean="0"/>
+              <a:rPr lang="en-US"/>
               <a:t>Second level</a:t>
             </a:r>
           </a:p>
           <a:p>
             <a:pPr lvl="2"/>
             <a:r>
-              <a:rPr lang="en-US" smtClean="0"/>
+              <a:rPr lang="en-US"/>
               <a:t>Third level</a:t>
             </a:r>
           </a:p>
           <a:p>
             <a:pPr lvl="3"/>
             <a:r>
-              <a:rPr lang="en-US" smtClean="0"/>
+              <a:rPr lang="en-US"/>
               <a:t>Fourth level</a:t>
             </a:r>
           </a:p>
           <a:p>
             <a:pPr lvl="4"/>
             <a:r>
-              <a:rPr lang="en-US" smtClean="0"/>
+              <a:rPr lang="en-US"/>
               <a:t>Fifth level</a:t>
             </a:r>
-            <a:endParaRPr lang="en-US"/>
           </a:p>
         </p:txBody>
       </p:sp>
@@ -3457,38 +3445,37 @@
           <a:p>
             <a:pPr lvl="0"/>
             <a:r>
-              <a:rPr lang="en-US" smtClean="0"/>
+              <a:rPr lang="en-US"/>
               <a:t>Click to edit Master text styles</a:t>
             </a:r>
           </a:p>
           <a:p>
             <a:pPr lvl="1"/>
             <a:r>
-              <a:rPr lang="en-US" smtClean="0"/>
+              <a:rPr lang="en-US"/>
               <a:t>Second level</a:t>
             </a:r>
           </a:p>
           <a:p>
             <a:pPr lvl="2"/>
             <a:r>
-              <a:rPr lang="en-US" smtClean="0"/>
+              <a:rPr lang="en-US"/>
               <a:t>Third level</a:t>
             </a:r>
           </a:p>
           <a:p>
             <a:pPr lvl="3"/>
             <a:r>
-              <a:rPr lang="en-US" smtClean="0"/>
+              <a:rPr lang="en-US"/>
               <a:t>Fourth level</a:t>
             </a:r>
           </a:p>
           <a:p>
             <a:pPr lvl="4"/>
             <a:r>
-              <a:rPr lang="en-US" smtClean="0"/>
+              <a:rPr lang="en-US"/>
               <a:t>Fifth level</a:t>
             </a:r>
-            <a:endParaRPr lang="en-US"/>
           </a:p>
         </p:txBody>
       </p:sp>
@@ -3519,7 +3506,7 @@
               <a:pPr>
                 <a:defRPr/>
               </a:pPr>
-              <a:t>11/29/17</a:t>
+              <a:t>2/10/18</a:t>
             </a:fld>
             <a:endParaRPr lang="en-US"/>
           </a:p>
@@ -3703,10 +3690,9 @@
           </a:lstStyle>
           <a:p>
             <a:r>
-              <a:rPr lang="en-US" smtClean="0"/>
+              <a:rPr lang="en-US"/>
               <a:t>Click to edit Master title style</a:t>
             </a:r>
-            <a:endParaRPr lang="en-US"/>
           </a:p>
         </p:txBody>
       </p:sp>
@@ -3769,7 +3755,7 @@
           <a:p>
             <a:pPr lvl="0"/>
             <a:r>
-              <a:rPr lang="en-US" smtClean="0"/>
+              <a:rPr lang="en-US"/>
               <a:t>Click to edit Master text styles</a:t>
             </a:r>
           </a:p>
@@ -3825,38 +3811,37 @@
           <a:p>
             <a:pPr lvl="0"/>
             <a:r>
-              <a:rPr lang="en-US" smtClean="0"/>
+              <a:rPr lang="en-US"/>
               <a:t>Click to edit Master text styles</a:t>
             </a:r>
           </a:p>
           <a:p>
             <a:pPr lvl="1"/>
             <a:r>
-              <a:rPr lang="en-US" smtClean="0"/>
+              <a:rPr lang="en-US"/>
               <a:t>Second level</a:t>
             </a:r>
           </a:p>
           <a:p>
             <a:pPr lvl="2"/>
             <a:r>
-              <a:rPr lang="en-US" smtClean="0"/>
+              <a:rPr lang="en-US"/>
               <a:t>Third level</a:t>
             </a:r>
           </a:p>
           <a:p>
             <a:pPr lvl="3"/>
             <a:r>
-              <a:rPr lang="en-US" smtClean="0"/>
+              <a:rPr lang="en-US"/>
               <a:t>Fourth level</a:t>
             </a:r>
           </a:p>
           <a:p>
             <a:pPr lvl="4"/>
             <a:r>
-              <a:rPr lang="en-US" smtClean="0"/>
+              <a:rPr lang="en-US"/>
               <a:t>Fifth level</a:t>
             </a:r>
-            <a:endParaRPr lang="en-US"/>
           </a:p>
         </p:txBody>
       </p:sp>
@@ -3919,7 +3904,7 @@
           <a:p>
             <a:pPr lvl="0"/>
             <a:r>
-              <a:rPr lang="en-US" smtClean="0"/>
+              <a:rPr lang="en-US"/>
               <a:t>Click to edit Master text styles</a:t>
             </a:r>
           </a:p>
@@ -3975,38 +3960,37 @@
           <a:p>
             <a:pPr lvl="0"/>
             <a:r>
-              <a:rPr lang="en-US" smtClean="0"/>
+              <a:rPr lang="en-US"/>
               <a:t>Click to edit Master text styles</a:t>
             </a:r>
           </a:p>
           <a:p>
             <a:pPr lvl="1"/>
             <a:r>
-              <a:rPr lang="en-US" smtClean="0"/>
+              <a:rPr lang="en-US"/>
               <a:t>Second level</a:t>
             </a:r>
           </a:p>
           <a:p>
             <a:pPr lvl="2"/>
             <a:r>
-              <a:rPr lang="en-US" smtClean="0"/>
+              <a:rPr lang="en-US"/>
               <a:t>Third level</a:t>
             </a:r>
           </a:p>
           <a:p>
             <a:pPr lvl="3"/>
             <a:r>
-              <a:rPr lang="en-US" smtClean="0"/>
+              <a:rPr lang="en-US"/>
               <a:t>Fourth level</a:t>
             </a:r>
           </a:p>
           <a:p>
             <a:pPr lvl="4"/>
             <a:r>
-              <a:rPr lang="en-US" smtClean="0"/>
+              <a:rPr lang="en-US"/>
               <a:t>Fifth level</a:t>
             </a:r>
-            <a:endParaRPr lang="en-US"/>
           </a:p>
         </p:txBody>
       </p:sp>
@@ -4037,7 +4021,7 @@
               <a:pPr>
                 <a:defRPr/>
               </a:pPr>
-              <a:t>11/29/17</a:t>
+              <a:t>2/10/18</a:t>
             </a:fld>
             <a:endParaRPr lang="en-US"/>
           </a:p>
@@ -4217,10 +4201,9 @@
           <a:lstStyle/>
           <a:p>
             <a:r>
-              <a:rPr lang="en-US" smtClean="0"/>
+              <a:rPr lang="en-US"/>
               <a:t>Click to edit Master title style</a:t>
             </a:r>
-            <a:endParaRPr lang="en-US"/>
           </a:p>
         </p:txBody>
       </p:sp>
@@ -4251,7 +4234,7 @@
               <a:pPr>
                 <a:defRPr/>
               </a:pPr>
-              <a:t>11/29/17</a:t>
+              <a:t>2/10/18</a:t>
             </a:fld>
             <a:endParaRPr lang="en-US"/>
           </a:p>
@@ -4373,7 +4356,7 @@
               <a:pPr>
                 <a:defRPr/>
               </a:pPr>
-              <a:t>11/29/17</a:t>
+              <a:t>2/10/18</a:t>
             </a:fld>
             <a:endParaRPr lang="en-US"/>
           </a:p>
@@ -4493,10 +4476,9 @@
           </a:lstStyle>
           <a:p>
             <a:r>
-              <a:rPr lang="en-US" smtClean="0"/>
+              <a:rPr lang="en-US"/>
               <a:t>Click to edit Master title style</a:t>
             </a:r>
-            <a:endParaRPr lang="en-US"/>
           </a:p>
         </p:txBody>
       </p:sp>
@@ -4550,38 +4532,37 @@
           <a:p>
             <a:pPr lvl="0"/>
             <a:r>
-              <a:rPr lang="en-US" smtClean="0"/>
+              <a:rPr lang="en-US"/>
               <a:t>Click to edit Master text styles</a:t>
             </a:r>
           </a:p>
           <a:p>
             <a:pPr lvl="1"/>
             <a:r>
-              <a:rPr lang="en-US" smtClean="0"/>
+              <a:rPr lang="en-US"/>
               <a:t>Second level</a:t>
             </a:r>
           </a:p>
           <a:p>
             <a:pPr lvl="2"/>
             <a:r>
-              <a:rPr lang="en-US" smtClean="0"/>
+              <a:rPr lang="en-US"/>
               <a:t>Third level</a:t>
             </a:r>
           </a:p>
           <a:p>
             <a:pPr lvl="3"/>
             <a:r>
-              <a:rPr lang="en-US" smtClean="0"/>
+              <a:rPr lang="en-US"/>
               <a:t>Fourth level</a:t>
             </a:r>
           </a:p>
           <a:p>
             <a:pPr lvl="4"/>
             <a:r>
-              <a:rPr lang="en-US" smtClean="0"/>
+              <a:rPr lang="en-US"/>
               <a:t>Fifth level</a:t>
             </a:r>
-            <a:endParaRPr lang="en-US"/>
           </a:p>
         </p:txBody>
       </p:sp>
@@ -4644,7 +4625,7 @@
           <a:p>
             <a:pPr lvl="0"/>
             <a:r>
-              <a:rPr lang="en-US" smtClean="0"/>
+              <a:rPr lang="en-US"/>
               <a:t>Click to edit Master text styles</a:t>
             </a:r>
           </a:p>
@@ -4677,7 +4658,7 @@
               <a:pPr>
                 <a:defRPr/>
               </a:pPr>
-              <a:t>11/29/17</a:t>
+              <a:t>2/10/18</a:t>
             </a:fld>
             <a:endParaRPr lang="en-US"/>
           </a:p>
@@ -4797,10 +4778,9 @@
           </a:lstStyle>
           <a:p>
             <a:r>
-              <a:rPr lang="en-US" smtClean="0"/>
+              <a:rPr lang="en-US"/>
               <a:t>Click to edit Master title style</a:t>
             </a:r>
-            <a:endParaRPr lang="en-US"/>
           </a:p>
         </p:txBody>
       </p:sp>
@@ -4864,7 +4844,7 @@
           </a:lstStyle>
           <a:p>
             <a:pPr lvl="0"/>
-            <a:endParaRPr lang="en-US" noProof="0" smtClean="0"/>
+            <a:endParaRPr lang="en-US" noProof="0"/>
           </a:p>
         </p:txBody>
       </p:sp>
@@ -4927,7 +4907,7 @@
           <a:p>
             <a:pPr lvl="0"/>
             <a:r>
-              <a:rPr lang="en-US" smtClean="0"/>
+              <a:rPr lang="en-US"/>
               <a:t>Click to edit Master text styles</a:t>
             </a:r>
           </a:p>
@@ -4960,7 +4940,7 @@
               <a:pPr>
                 <a:defRPr/>
               </a:pPr>
-              <a:t>11/29/17</a:t>
+              <a:t>2/10/18</a:t>
             </a:fld>
             <a:endParaRPr lang="en-US"/>
           </a:p>
@@ -5142,7 +5122,7 @@
           <a:p>
             <a:pPr lvl="0"/>
             <a:r>
-              <a:rPr lang="en-US" smtClean="0"/>
+              <a:rPr lang="en-US"/>
               <a:t>Click to edit Master title style</a:t>
             </a:r>
           </a:p>
@@ -5200,35 +5180,35 @@
           <a:p>
             <a:pPr lvl="0"/>
             <a:r>
-              <a:rPr lang="en-US" smtClean="0"/>
+              <a:rPr lang="en-US"/>
               <a:t>Click to edit Master text styles</a:t>
             </a:r>
           </a:p>
           <a:p>
             <a:pPr lvl="1"/>
             <a:r>
-              <a:rPr lang="en-US" smtClean="0"/>
+              <a:rPr lang="en-US"/>
               <a:t>Second level</a:t>
             </a:r>
           </a:p>
           <a:p>
             <a:pPr lvl="2"/>
             <a:r>
-              <a:rPr lang="en-US" smtClean="0"/>
+              <a:rPr lang="en-US"/>
               <a:t>Third level</a:t>
             </a:r>
           </a:p>
           <a:p>
             <a:pPr lvl="3"/>
             <a:r>
-              <a:rPr lang="en-US" smtClean="0"/>
+              <a:rPr lang="en-US"/>
               <a:t>Fourth level</a:t>
             </a:r>
           </a:p>
           <a:p>
             <a:pPr lvl="4"/>
             <a:r>
-              <a:rPr lang="en-US" smtClean="0"/>
+              <a:rPr lang="en-US"/>
               <a:t>Fifth level</a:t>
             </a:r>
           </a:p>
@@ -5276,7 +5256,7 @@
               <a:pPr>
                 <a:defRPr/>
               </a:pPr>
-              <a:t>11/29/17</a:t>
+              <a:t>2/10/18</a:t>
             </a:fld>
             <a:endParaRPr lang="en-US"/>
           </a:p>
@@ -5811,21 +5791,20 @@
           <a:lstStyle/>
           <a:p>
             <a:r>
-              <a:rPr lang="en-US" sz="2000" dirty="0" smtClean="0"/>
+              <a:rPr lang="en-US" sz="2000" dirty="0"/>
               <a:t>Please attribute as </a:t>
             </a:r>
             <a:br>
-              <a:rPr lang="en-US" sz="2000" dirty="0" smtClean="0"/>
+              <a:rPr lang="en-US" sz="2000" dirty="0"/>
             </a:br>
             <a:r>
-              <a:rPr lang="en-US" sz="2000" dirty="0" err="1" smtClean="0"/>
+              <a:rPr lang="en-US" sz="2000" dirty="0" err="1"/>
               <a:t>SimpleITK</a:t>
             </a:r>
             <a:r>
-              <a:rPr lang="en-US" sz="2000" dirty="0" smtClean="0"/>
+              <a:rPr lang="en-US" sz="2000" dirty="0"/>
               <a:t> Historical Overview (SPIE Medical Imaging 2018)</a:t>
             </a:r>
-            <a:endParaRPr lang="en-US" sz="2000" dirty="0"/>
           </a:p>
         </p:txBody>
       </p:sp>
@@ -5856,20 +5835,12 @@
                   <a:schemeClr val="tx1"/>
                 </a:solidFill>
               </a:rPr>
-              <a:t>This work is </a:t>
-            </a:r>
-            <a:r>
-              <a:rPr lang="en-US" sz="2000" dirty="0" smtClean="0">
-                <a:solidFill>
-                  <a:schemeClr val="tx1"/>
-                </a:solidFill>
-              </a:rPr>
-              <a:t>copyrighted by the Insight Software Consortium </a:t>
+              <a:t>This work is copyrighted by the Insight Software Consortium </a:t>
             </a:r>
           </a:p>
           <a:p>
             <a:pPr algn="l"/>
-            <a:endParaRPr lang="en-US" sz="2000" dirty="0" smtClean="0">
+            <a:endParaRPr lang="en-US" sz="2000" dirty="0">
               <a:solidFill>
                 <a:schemeClr val="tx1"/>
               </a:solidFill>
@@ -5878,36 +5849,12 @@
           <a:p>
             <a:pPr algn="l"/>
             <a:r>
-              <a:rPr lang="en-US" sz="2000" dirty="0" smtClean="0">
+              <a:rPr lang="en-US" sz="2000" dirty="0">
                 <a:solidFill>
                   <a:schemeClr val="tx1"/>
                 </a:solidFill>
               </a:rPr>
-              <a:t>It is distributed under </a:t>
-            </a:r>
-            <a:r>
-              <a:rPr lang="en-US" sz="2000" dirty="0">
-                <a:solidFill>
-                  <a:schemeClr val="tx1"/>
-                </a:solidFill>
-              </a:rPr>
-              <a:t>a Creative Commons Attribution 4.0 International </a:t>
-            </a:r>
-            <a:r>
-              <a:rPr lang="en-US" sz="2000" dirty="0" smtClean="0">
-                <a:solidFill>
-                  <a:schemeClr val="tx1"/>
-                </a:solidFill>
-              </a:rPr>
-              <a:t>License: https</a:t>
-            </a:r>
-            <a:r>
-              <a:rPr lang="en-US" sz="2000" dirty="0">
-                <a:solidFill>
-                  <a:schemeClr val="tx1"/>
-                </a:solidFill>
-              </a:rPr>
-              <a:t>://creativecommons.org/licenses/by/4.0/</a:t>
+              <a:t>It is distributed under a Creative Commons Attribution 4.0 International License: https://creativecommons.org/licenses/by/4.0/</a:t>
             </a:r>
           </a:p>
         </p:txBody>
@@ -6004,21 +5951,6 @@
   <p:clrMapOvr>
     <a:masterClrMapping/>
   </p:clrMapOvr>
-  <mc:AlternateContent xmlns:mc="http://schemas.openxmlformats.org/markup-compatibility/2006">
-    <mc:Choice xmlns:p14="http://schemas.microsoft.com/office/powerpoint/2010/main" Requires="p14">
-      <p:transition spd="slow" p14:dur="2000"/>
-    </mc:Choice>
-    <mc:Fallback>
-      <p:transition spd="slow"/>
-    </mc:Fallback>
-  </mc:AlternateContent>
-  <p:timing>
-    <p:tnLst>
-      <p:par>
-        <p:cTn id="1" dur="indefinite" restart="never" nodeType="tmRoot"/>
-      </p:par>
-    </p:tnLst>
-  </p:timing>
 </p:sld>
 </file>
 
@@ -6055,10 +5987,9 @@
           <a:lstStyle/>
           <a:p>
             <a:r>
-              <a:rPr lang="en-US" dirty="0" smtClean="0"/>
+              <a:rPr lang="en-US" dirty="0"/>
               <a:t>User Community</a:t>
             </a:r>
-            <a:endParaRPr lang="en-US" dirty="0"/>
           </a:p>
         </p:txBody>
       </p:sp>
@@ -6101,13 +6032,6 @@
   <p:clrMapOvr>
     <a:masterClrMapping/>
   </p:clrMapOvr>
-  <p:timing>
-    <p:tnLst>
-      <p:par>
-        <p:cTn id="1" dur="indefinite" restart="never" nodeType="tmRoot"/>
-      </p:par>
-    </p:tnLst>
-  </p:timing>
 </p:sld>
 </file>
 
@@ -6190,17 +6114,222 @@
   <p:clrMapOvr>
     <a:masterClrMapping/>
   </p:clrMapOvr>
-  <p:timing>
-    <p:tnLst>
-      <p:par>
-        <p:cTn id="1" dur="indefinite" restart="never" nodeType="tmRoot"/>
-      </p:par>
-    </p:tnLst>
-  </p:timing>
 </p:sld>
 </file>
 
 <file path=ppt/slides/slide12.xml><?xml version="1.0" encoding="utf-8"?>
+<p:sld xmlns:a="http://schemas.openxmlformats.org/drawingml/2006/main" xmlns:r="http://schemas.openxmlformats.org/officeDocument/2006/relationships" xmlns:p="http://schemas.openxmlformats.org/presentationml/2006/main">
+  <p:cSld>
+    <p:spTree>
+      <p:nvGrpSpPr>
+        <p:cNvPr id="1" name=""/>
+        <p:cNvGrpSpPr/>
+        <p:nvPr/>
+      </p:nvGrpSpPr>
+      <p:grpSpPr>
+        <a:xfrm>
+          <a:off x="0" y="0"/>
+          <a:ext cx="0" cy="0"/>
+          <a:chOff x="0" y="0"/>
+          <a:chExt cx="0" cy="0"/>
+        </a:xfrm>
+      </p:grpSpPr>
+      <p:sp>
+        <p:nvSpPr>
+          <p:cNvPr id="2" name="Title 1">
+            <a:extLst>
+              <a:ext uri="{FF2B5EF4-FFF2-40B4-BE49-F238E27FC236}">
+                <a16:creationId xmlns:a16="http://schemas.microsoft.com/office/drawing/2014/main" id="{E26AA7A6-C21E-4445-AECC-762048FFC903}"/>
+              </a:ext>
+            </a:extLst>
+          </p:cNvPr>
+          <p:cNvSpPr>
+            <a:spLocks noGrp="1"/>
+          </p:cNvSpPr>
+          <p:nvPr>
+            <p:ph type="title"/>
+          </p:nvPr>
+        </p:nvSpPr>
+        <p:spPr/>
+        <p:txBody>
+          <a:bodyPr/>
+          <a:lstStyle/>
+          <a:p>
+            <a:r>
+              <a:rPr lang="en-US" dirty="0"/>
+              <a:t>How to Cite</a:t>
+            </a:r>
+          </a:p>
+        </p:txBody>
+      </p:sp>
+      <p:sp>
+        <p:nvSpPr>
+          <p:cNvPr id="3" name="Content Placeholder 2">
+            <a:extLst>
+              <a:ext uri="{FF2B5EF4-FFF2-40B4-BE49-F238E27FC236}">
+                <a16:creationId xmlns:a16="http://schemas.microsoft.com/office/drawing/2014/main" id="{FDCAB736-AF44-2F4D-A2E6-6890065C5AD8}"/>
+              </a:ext>
+            </a:extLst>
+          </p:cNvPr>
+          <p:cNvSpPr>
+            <a:spLocks noGrp="1"/>
+          </p:cNvSpPr>
+          <p:nvPr>
+            <p:ph idx="1"/>
+          </p:nvPr>
+        </p:nvSpPr>
+        <p:spPr/>
+        <p:txBody>
+          <a:bodyPr/>
+          <a:lstStyle/>
+          <a:p>
+            <a:r>
+              <a:rPr lang="en-US" sz="2000" dirty="0"/>
+              <a:t>B. C. Lowekamp, D. T. Chen, L. Ibáñez, D. </a:t>
+            </a:r>
+            <a:r>
+              <a:rPr lang="en-US" sz="2000" dirty="0" err="1"/>
+              <a:t>Blezek</a:t>
+            </a:r>
+            <a:r>
+              <a:rPr lang="en-US" sz="2000" dirty="0"/>
+              <a:t>, "The Design of </a:t>
+            </a:r>
+            <a:r>
+              <a:rPr lang="en-US" sz="2000" dirty="0" err="1"/>
+              <a:t>SimpleITK</a:t>
+            </a:r>
+            <a:r>
+              <a:rPr lang="en-US" sz="2000" dirty="0"/>
+              <a:t>", </a:t>
+            </a:r>
+            <a:r>
+              <a:rPr lang="en-US" sz="2000" i="1" dirty="0"/>
+              <a:t>Front. </a:t>
+            </a:r>
+            <a:r>
+              <a:rPr lang="en-US" sz="2000" i="1" dirty="0" err="1"/>
+              <a:t>Neuroinform</a:t>
+            </a:r>
+            <a:r>
+              <a:rPr lang="en-US" sz="2000" i="1" dirty="0"/>
+              <a:t>.</a:t>
+            </a:r>
+            <a:r>
+              <a:rPr lang="en-US" sz="2000" dirty="0"/>
+              <a:t>, 7:45. </a:t>
+            </a:r>
+            <a:r>
+              <a:rPr lang="en-US" sz="2000" dirty="0">
+                <a:hlinkClick r:id="rId2"/>
+              </a:rPr>
+              <a:t>https://doi.org/10.3389/fninf.2013.00045</a:t>
+            </a:r>
+            <a:r>
+              <a:rPr lang="en-US" sz="2000" dirty="0"/>
+              <a:t>, 2013.</a:t>
+            </a:r>
+          </a:p>
+          <a:p>
+            <a:r>
+              <a:rPr lang="en-US" sz="2000" dirty="0"/>
+              <a:t>Z. </a:t>
+            </a:r>
+            <a:r>
+              <a:rPr lang="en-US" sz="2000" dirty="0" err="1"/>
+              <a:t>Yaniv</a:t>
+            </a:r>
+            <a:r>
+              <a:rPr lang="en-US" sz="2000" dirty="0"/>
+              <a:t>, B. C. Lowekamp, H. J. Johnson, R. </a:t>
+            </a:r>
+            <a:r>
+              <a:rPr lang="en-US" sz="2000" dirty="0" err="1"/>
+              <a:t>Beare</a:t>
+            </a:r>
+            <a:r>
+              <a:rPr lang="en-US" sz="2000" dirty="0"/>
+              <a:t>, "</a:t>
+            </a:r>
+            <a:r>
+              <a:rPr lang="en-US" sz="2000" dirty="0" err="1"/>
+              <a:t>SimpleITK</a:t>
+            </a:r>
+            <a:r>
+              <a:rPr lang="en-US" sz="2000" dirty="0"/>
+              <a:t> Image-Analysis Notebooks: a Collaborative Environment for Education and Reproducible Research", </a:t>
+            </a:r>
+            <a:r>
+              <a:rPr lang="en-US" sz="2000" i="1" dirty="0"/>
+              <a:t>J Digit Imaging.</a:t>
+            </a:r>
+            <a:r>
+              <a:rPr lang="en-US" sz="2000" dirty="0"/>
+              <a:t>, </a:t>
+            </a:r>
+            <a:r>
+              <a:rPr lang="en-US" sz="2000" dirty="0">
+                <a:hlinkClick r:id="rId3"/>
+              </a:rPr>
+              <a:t>https://doi.org/10.1007/s10278-017-0037-8</a:t>
+            </a:r>
+            <a:r>
+              <a:rPr lang="en-US" sz="2000" dirty="0"/>
+              <a:t>, 2017.</a:t>
+            </a:r>
+          </a:p>
+          <a:p>
+            <a:r>
+              <a:rPr lang="en-US" sz="2000" dirty="0"/>
+              <a:t>R. </a:t>
+            </a:r>
+            <a:r>
+              <a:rPr lang="en-US" sz="2000" dirty="0" err="1"/>
+              <a:t>Beare</a:t>
+            </a:r>
+            <a:r>
+              <a:rPr lang="en-US" sz="2000" dirty="0"/>
+              <a:t>, B. Lowekamp, and Z. </a:t>
+            </a:r>
+            <a:r>
+              <a:rPr lang="en-US" sz="2000" dirty="0" err="1"/>
+              <a:t>Yaniv</a:t>
+            </a:r>
+            <a:r>
+              <a:rPr lang="en-US" sz="2000" dirty="0"/>
+              <a:t>, “Image segmentation, registration and characterization in R with </a:t>
+            </a:r>
+            <a:r>
+              <a:rPr lang="en-US" sz="2000" dirty="0" err="1"/>
+              <a:t>SimpleITK</a:t>
+            </a:r>
+            <a:r>
+              <a:rPr lang="en-US" sz="2000" dirty="0"/>
+              <a:t>,” Journal of Statistical Software, in press.</a:t>
+            </a:r>
+          </a:p>
+          <a:p>
+            <a:endParaRPr lang="en-US" sz="2000" dirty="0"/>
+          </a:p>
+          <a:p>
+            <a:endParaRPr lang="en-US" dirty="0"/>
+          </a:p>
+        </p:txBody>
+      </p:sp>
+    </p:spTree>
+    <p:extLst>
+      <p:ext uri="{BB962C8B-B14F-4D97-AF65-F5344CB8AC3E}">
+        <p14:creationId xmlns:p14="http://schemas.microsoft.com/office/powerpoint/2010/main" val="717055894"/>
+      </p:ext>
+    </p:extLst>
+  </p:cSld>
+  <p:clrMapOvr>
+    <a:masterClrMapping/>
+  </p:clrMapOvr>
+</p:sld>
+</file>
+
+<file path=ppt/slides/slide13.xml><?xml version="1.0" encoding="utf-8"?>
 <p:sld xmlns:a="http://schemas.openxmlformats.org/drawingml/2006/main" xmlns:r="http://schemas.openxmlformats.org/officeDocument/2006/relationships" xmlns:p="http://schemas.openxmlformats.org/presentationml/2006/main">
   <p:cSld>
     <p:spTree>
@@ -6257,13 +6386,6 @@
   <p:clrMapOvr>
     <a:masterClrMapping/>
   </p:clrMapOvr>
-  <p:timing>
-    <p:tnLst>
-      <p:par>
-        <p:cTn id="1" dur="indefinite" restart="never" nodeType="tmRoot"/>
-      </p:par>
-    </p:tnLst>
-  </p:timing>
 </p:sld>
 </file>
 
@@ -6317,26 +6439,10 @@
               <a:rPr lang="en-US" sz="3600" dirty="0"/>
             </a:br>
             <a:r>
-              <a:rPr lang="en-US" sz="3600" dirty="0" smtClean="0"/>
-              <a:t>Standing </a:t>
-            </a:r>
-            <a:r>
               <a:rPr lang="en-US" sz="3600" dirty="0"/>
-              <a:t>on the </a:t>
-            </a:r>
-            <a:r>
-              <a:rPr lang="en-US" sz="3600" dirty="0" smtClean="0"/>
-              <a:t>Shoulders </a:t>
-            </a:r>
-            <a:r>
-              <a:rPr lang="en-US" sz="3600" dirty="0"/>
-              <a:t>of </a:t>
-            </a:r>
-            <a:r>
-              <a:rPr lang="en-US" sz="3600" dirty="0" smtClean="0"/>
-              <a:t>Giants</a:t>
-            </a:r>
-            <a:endParaRPr lang="en-US" sz="3600" dirty="0" smtClean="0">
+              <a:t>Standing on the Shoulders of Giants</a:t>
+            </a:r>
+            <a:endParaRPr lang="en-US" sz="3600" dirty="0">
               <a:latin typeface="Arial" charset="0"/>
               <a:ea typeface="ＭＳ Ｐゴシック" pitchFamily="34" charset="-128"/>
               <a:cs typeface="Arial" charset="0"/>
@@ -6567,7 +6673,7 @@
               </a:lnSpc>
             </a:pPr>
             <a:r>
-              <a:rPr lang="en-US" sz="2400" baseline="30000" dirty="0" smtClean="0">
+              <a:rPr lang="en-US" sz="2400" baseline="30000" dirty="0">
                 <a:solidFill>
                   <a:schemeClr val="tx1"/>
                 </a:solidFill>
@@ -6578,7 +6684,7 @@
               <a:t>1</a:t>
             </a:r>
             <a:r>
-              <a:rPr lang="en-US" sz="2400" dirty="0" smtClean="0">
+              <a:rPr lang="en-US" sz="2400" dirty="0">
                 <a:solidFill>
                   <a:schemeClr val="tx1"/>
                 </a:solidFill>
@@ -6589,7 +6695,7 @@
               <a:t>Hans J. Johnson, </a:t>
             </a:r>
             <a:r>
-              <a:rPr lang="en-US" sz="2400" baseline="30000" dirty="0" smtClean="0">
+              <a:rPr lang="en-US" sz="2400" baseline="30000" dirty="0">
                 <a:solidFill>
                   <a:schemeClr val="tx1"/>
                 </a:solidFill>
@@ -6600,7 +6706,7 @@
               <a:t>2</a:t>
             </a:r>
             <a:r>
-              <a:rPr lang="en-US" sz="2400" dirty="0" smtClean="0">
+              <a:rPr lang="en-US" sz="2400" dirty="0">
                 <a:solidFill>
                   <a:schemeClr val="tx1"/>
                 </a:solidFill>
@@ -6611,7 +6717,7 @@
               <a:t>Bradley C. </a:t>
             </a:r>
             <a:r>
-              <a:rPr lang="en-US" sz="2400" dirty="0" err="1" smtClean="0">
+              <a:rPr lang="en-US" sz="2400" dirty="0" err="1">
                 <a:solidFill>
                   <a:schemeClr val="tx1"/>
                 </a:solidFill>
@@ -6622,7 +6728,7 @@
               <a:t>Lowekamp</a:t>
             </a:r>
             <a:r>
-              <a:rPr lang="en-US" sz="2400" dirty="0" smtClean="0">
+              <a:rPr lang="en-US" sz="2400" dirty="0">
                 <a:solidFill>
                   <a:schemeClr val="tx1"/>
                 </a:solidFill>
@@ -6633,7 +6739,7 @@
               <a:t>, </a:t>
             </a:r>
             <a:r>
-              <a:rPr lang="en-US" sz="2400" baseline="30000" dirty="0" smtClean="0">
+              <a:rPr lang="en-US" sz="2400" baseline="30000" dirty="0">
                 <a:solidFill>
                   <a:schemeClr val="tx1"/>
                 </a:solidFill>
@@ -6644,7 +6750,7 @@
               <a:t>3</a:t>
             </a:r>
             <a:r>
-              <a:rPr lang="en-US" sz="2400" dirty="0" smtClean="0">
+              <a:rPr lang="en-US" sz="2400" dirty="0">
                 <a:solidFill>
                   <a:schemeClr val="tx1"/>
                 </a:solidFill>
@@ -6661,7 +6767,7 @@
                 <a:spcPct val="80000"/>
               </a:lnSpc>
             </a:pPr>
-            <a:endParaRPr lang="en-US" sz="2400" dirty="0" smtClean="0">
+            <a:endParaRPr lang="en-US" sz="2400" dirty="0">
               <a:solidFill>
                 <a:schemeClr val="tx1"/>
               </a:solidFill>
@@ -6677,7 +6783,7 @@
               </a:lnSpc>
             </a:pPr>
             <a:r>
-              <a:rPr lang="en-US" sz="2400" baseline="30000" dirty="0" smtClean="0">
+              <a:rPr lang="en-US" sz="2400" baseline="30000" dirty="0">
                 <a:solidFill>
                   <a:schemeClr val="tx1"/>
                 </a:solidFill>
@@ -6688,7 +6794,7 @@
               <a:t>1</a:t>
             </a:r>
             <a:r>
-              <a:rPr lang="en-US" sz="2400" dirty="0" smtClean="0">
+              <a:rPr lang="en-US" sz="2400" dirty="0">
                 <a:solidFill>
                   <a:schemeClr val="tx1"/>
                 </a:solidFill>
@@ -6696,38 +6802,8 @@
                 <a:ea typeface="ＭＳ Ｐゴシック" pitchFamily="34" charset="-128"/>
                 <a:cs typeface="Arial" charset="0"/>
               </a:rPr>
-              <a:t>The </a:t>
-            </a:r>
-            <a:r>
-              <a:rPr lang="en-US" sz="2400" dirty="0">
-                <a:solidFill>
-                  <a:schemeClr val="tx1"/>
-                </a:solidFill>
-                <a:latin typeface="Arial" charset="0"/>
-                <a:ea typeface="ＭＳ Ｐゴシック" pitchFamily="34" charset="-128"/>
-                <a:cs typeface="Arial" charset="0"/>
-              </a:rPr>
-              <a:t>University of </a:t>
-            </a:r>
-            <a:r>
-              <a:rPr lang="en-US" sz="2400" dirty="0" smtClean="0">
-                <a:solidFill>
-                  <a:schemeClr val="tx1"/>
-                </a:solidFill>
-                <a:latin typeface="Arial" charset="0"/>
-                <a:ea typeface="ＭＳ Ｐゴシック" pitchFamily="34" charset="-128"/>
-                <a:cs typeface="Arial" charset="0"/>
-              </a:rPr>
-              <a:t>Iowa</a:t>
-            </a:r>
-            <a:endParaRPr lang="en-US" sz="2400" dirty="0" smtClean="0">
-              <a:solidFill>
-                <a:schemeClr val="tx1"/>
-              </a:solidFill>
-              <a:latin typeface="Arial" charset="0"/>
-              <a:ea typeface="ＭＳ Ｐゴシック" pitchFamily="34" charset="-128"/>
-              <a:cs typeface="Arial" charset="0"/>
-            </a:endParaRPr>
+              <a:t>The University of Iowa</a:t>
+            </a:r>
           </a:p>
           <a:p>
             <a:pPr eaLnBrk="1" hangingPunct="1">
@@ -6736,7 +6812,7 @@
               </a:lnSpc>
             </a:pPr>
             <a:r>
-              <a:rPr lang="en-US" sz="2400" baseline="30000" dirty="0" smtClean="0">
+              <a:rPr lang="en-US" sz="2400" baseline="30000" dirty="0">
                 <a:solidFill>
                   <a:schemeClr val="tx1"/>
                 </a:solidFill>
@@ -6747,7 +6823,7 @@
               <a:t>2</a:t>
             </a:r>
             <a:r>
-              <a:rPr lang="en-US" sz="2400" dirty="0" smtClean="0">
+              <a:rPr lang="en-US" sz="2400" dirty="0">
                 <a:solidFill>
                   <a:schemeClr val="tx1"/>
                 </a:solidFill>
@@ -6755,21 +6831,10 @@
                 <a:ea typeface="ＭＳ Ｐゴシック" pitchFamily="34" charset="-128"/>
                 <a:cs typeface="Arial" charset="0"/>
               </a:rPr>
-              <a:t>National </a:t>
-            </a:r>
-            <a:r>
-              <a:rPr lang="en-US" sz="2400" dirty="0" smtClean="0">
-                <a:solidFill>
-                  <a:schemeClr val="tx1"/>
-                </a:solidFill>
-                <a:latin typeface="Arial" charset="0"/>
-                <a:ea typeface="ＭＳ Ｐゴシック" pitchFamily="34" charset="-128"/>
-                <a:cs typeface="Arial" charset="0"/>
-              </a:rPr>
-              <a:t>Institutes of Health</a:t>
+              <a:t>National Institutes of Health</a:t>
             </a:r>
             <a:br>
-              <a:rPr lang="en-US" sz="2400" dirty="0" smtClean="0">
+              <a:rPr lang="en-US" sz="2400" dirty="0">
                 <a:solidFill>
                   <a:schemeClr val="tx1"/>
                 </a:solidFill>
@@ -6779,7 +6844,7 @@
               </a:rPr>
             </a:br>
             <a:r>
-              <a:rPr lang="en-US" sz="2400" baseline="30000" dirty="0" smtClean="0">
+              <a:rPr lang="en-US" sz="2400" baseline="30000" dirty="0">
                 <a:solidFill>
                   <a:schemeClr val="tx1"/>
                 </a:solidFill>
@@ -6790,7 +6855,7 @@
               <a:t>3</a:t>
             </a:r>
             <a:r>
-              <a:rPr lang="en-US" sz="2400" dirty="0" smtClean="0">
+              <a:rPr lang="en-US" sz="2400" dirty="0">
                 <a:solidFill>
                   <a:schemeClr val="tx1"/>
                 </a:solidFill>
@@ -6798,29 +6863,7 @@
                 <a:ea typeface="ＭＳ Ｐゴシック" pitchFamily="34" charset="-128"/>
                 <a:cs typeface="Arial" charset="0"/>
               </a:rPr>
-              <a:t>TAJ </a:t>
-            </a:r>
-            <a:r>
-              <a:rPr lang="en-US" sz="2400" dirty="0">
-                <a:solidFill>
-                  <a:schemeClr val="tx1"/>
-                </a:solidFill>
-                <a:latin typeface="Arial" charset="0"/>
-                <a:ea typeface="ＭＳ Ｐゴシック" pitchFamily="34" charset="-128"/>
-                <a:cs typeface="Arial" charset="0"/>
-              </a:rPr>
-              <a:t>Technologies Inc</a:t>
-            </a:r>
-            <a:r>
-              <a:rPr lang="en-US" sz="2400" dirty="0" smtClean="0">
-                <a:solidFill>
-                  <a:schemeClr val="tx1"/>
-                </a:solidFill>
-                <a:latin typeface="Arial" charset="0"/>
-                <a:ea typeface="ＭＳ Ｐゴシック" pitchFamily="34" charset="-128"/>
-                <a:cs typeface="Arial" charset="0"/>
-              </a:rPr>
-              <a:t>.</a:t>
+              <a:t>TAJ Technologies Inc.</a:t>
             </a:r>
           </a:p>
           <a:p>
@@ -6830,7 +6873,7 @@
               </a:lnSpc>
             </a:pPr>
             <a:r>
-              <a:rPr lang="en-US" sz="2400" baseline="30000" dirty="0" smtClean="0">
+              <a:rPr lang="en-US" sz="2400" baseline="30000" dirty="0">
                 <a:solidFill>
                   <a:schemeClr val="tx1"/>
                 </a:solidFill>
@@ -6841,7 +6884,7 @@
               <a:t>4</a:t>
             </a:r>
             <a:r>
-              <a:rPr lang="en-US" sz="2400" dirty="0" smtClean="0">
+              <a:rPr lang="en-US" sz="2400" dirty="0">
                 <a:solidFill>
                   <a:schemeClr val="tx1"/>
                 </a:solidFill>
@@ -6858,7 +6901,7 @@
                 <a:spcPct val="80000"/>
               </a:lnSpc>
             </a:pPr>
-            <a:endParaRPr lang="en-US" sz="2400" dirty="0" smtClean="0">
+            <a:endParaRPr lang="en-US" sz="2400" dirty="0">
               <a:solidFill>
                 <a:schemeClr val="tx1"/>
               </a:solidFill>
@@ -7005,13 +7048,6 @@
   <p:clrMapOvr>
     <a:masterClrMapping/>
   </p:clrMapOvr>
-  <p:timing>
-    <p:tnLst>
-      <p:par>
-        <p:cTn id="1" dur="indefinite" restart="never" nodeType="tmRoot"/>
-      </p:par>
-    </p:tnLst>
-  </p:timing>
 </p:sld>
 </file>
 
@@ -7048,18 +7084,17 @@
           <a:lstStyle/>
           <a:p>
             <a:r>
-              <a:rPr lang="en-US" dirty="0" smtClean="0"/>
+              <a:rPr lang="en-US" dirty="0"/>
               <a:t>What is </a:t>
             </a:r>
             <a:r>
-              <a:rPr lang="en-US" dirty="0" err="1" smtClean="0"/>
+              <a:rPr lang="en-US" dirty="0" err="1"/>
               <a:t>SimpleITK</a:t>
             </a:r>
             <a:r>
-              <a:rPr lang="en-US" dirty="0" smtClean="0"/>
+              <a:rPr lang="en-US" dirty="0"/>
               <a:t>?</a:t>
             </a:r>
-            <a:endParaRPr lang="en-US" dirty="0"/>
           </a:p>
         </p:txBody>
       </p:sp>
@@ -7087,59 +7122,41 @@
               <a:buNone/>
             </a:pPr>
             <a:r>
-              <a:rPr lang="en-US" dirty="0" smtClean="0"/>
-              <a:t>A </a:t>
-            </a:r>
-            <a:r>
               <a:rPr lang="en-US" dirty="0"/>
-              <a:t>simplified multi-language interface to the National Library of Medicine’s Insight Segmentation </a:t>
-            </a:r>
-            <a:r>
-              <a:rPr lang="en-US" dirty="0" smtClean="0"/>
-              <a:t>and Registration </a:t>
-            </a:r>
-            <a:r>
-              <a:rPr lang="en-US" dirty="0"/>
-              <a:t>Toolkit (ITK</a:t>
-            </a:r>
-            <a:r>
-              <a:rPr lang="en-US" dirty="0" smtClean="0"/>
-              <a:t>).</a:t>
+              <a:t>A simplified multi-language interface to the National Library of Medicine’s Insight Segmentation and Registration Toolkit (ITK).</a:t>
             </a:r>
           </a:p>
           <a:p>
             <a:pPr marL="0" indent="0">
               <a:buNone/>
             </a:pPr>
-            <a:endParaRPr lang="en-US" dirty="0" smtClean="0"/>
+            <a:endParaRPr lang="en-US" dirty="0"/>
           </a:p>
           <a:p>
             <a:pPr marL="0" indent="0">
               <a:buNone/>
             </a:pPr>
             <a:r>
-              <a:rPr lang="en-US" dirty="0" smtClean="0"/>
+              <a:rPr lang="en-US" dirty="0"/>
               <a:t>Available in:</a:t>
             </a:r>
-            <a:endParaRPr lang="en-US" dirty="0"/>
           </a:p>
           <a:p>
             <a:pPr marL="0" indent="0">
               <a:buNone/>
             </a:pPr>
             <a:r>
-              <a:rPr lang="en-US" dirty="0" smtClean="0"/>
+              <a:rPr lang="en-US" dirty="0"/>
               <a:t>C++, Python, R, Java, C#, </a:t>
             </a:r>
             <a:r>
-              <a:rPr lang="en-US" dirty="0" err="1" smtClean="0"/>
+              <a:rPr lang="en-US" dirty="0" err="1"/>
               <a:t>Lua</a:t>
             </a:r>
             <a:r>
-              <a:rPr lang="en-US" dirty="0" smtClean="0"/>
+              <a:rPr lang="en-US" dirty="0"/>
               <a:t>, Ruby, TCL</a:t>
             </a:r>
-            <a:endParaRPr lang="en-US" dirty="0"/>
           </a:p>
         </p:txBody>
       </p:sp>
@@ -7171,25 +7188,25 @@
           <a:lstStyle/>
           <a:p>
             <a:r>
-              <a:rPr lang="en-US" sz="4400" dirty="0" smtClean="0">
+              <a:rPr lang="en-US" sz="4400" dirty="0">
                 <a:hlinkClick r:id="rId2"/>
               </a:rPr>
               <a:t>github.com/</a:t>
             </a:r>
             <a:r>
-              <a:rPr lang="en-US" sz="4400" dirty="0" err="1" smtClean="0">
+              <a:rPr lang="en-US" sz="4400" dirty="0" err="1">
                 <a:hlinkClick r:id="rId2"/>
               </a:rPr>
               <a:t>SimpleITK</a:t>
             </a:r>
             <a:r>
-              <a:rPr lang="en-US" sz="4400" dirty="0" smtClean="0">
+              <a:rPr lang="en-US" sz="4400" dirty="0">
                 <a:hlinkClick r:id="rId2"/>
               </a:rPr>
               <a:t>/</a:t>
             </a:r>
             <a:r>
-              <a:rPr lang="en-US" sz="4400" dirty="0" err="1" smtClean="0">
+              <a:rPr lang="en-US" sz="4400" dirty="0" err="1">
                 <a:hlinkClick r:id="rId2"/>
               </a:rPr>
               <a:t>SimpleITK</a:t>
@@ -7208,13 +7225,6 @@
   <p:clrMapOvr>
     <a:masterClrMapping/>
   </p:clrMapOvr>
-  <p:timing>
-    <p:tnLst>
-      <p:par>
-        <p:cTn id="1" dur="indefinite" restart="never" nodeType="tmRoot"/>
-      </p:par>
-    </p:tnLst>
-  </p:timing>
 </p:sld>
 </file>
 
@@ -7251,10 +7261,9 @@
           <a:lstStyle/>
           <a:p>
             <a:r>
-              <a:rPr lang="en-US" dirty="0" smtClean="0"/>
+              <a:rPr lang="en-US" dirty="0"/>
               <a:t>In the Beginning There Was Data</a:t>
             </a:r>
-            <a:endParaRPr lang="en-US" dirty="0"/>
           </a:p>
         </p:txBody>
       </p:sp>
@@ -7320,10 +7329,9 @@
           <a:lstStyle/>
           <a:p>
             <a:r>
-              <a:rPr lang="en-US" dirty="0" smtClean="0"/>
+              <a:rPr lang="en-US" dirty="0"/>
               <a:t>1994</a:t>
             </a:r>
-            <a:endParaRPr lang="en-US" dirty="0"/>
           </a:p>
         </p:txBody>
       </p:sp>
@@ -7359,7 +7367,7 @@
               </a:rPr>
               <a:t>“The Visible Human Male: A Technical Report", V. Spitzer et al., J. Am. Med. Inform. Assoc.,3(2), pp. 118-130, 1996.</a:t>
             </a:r>
-            <a:endParaRPr lang="en-US" sz="1400" i="1" dirty="0" smtClean="0">
+            <a:endParaRPr lang="en-US" sz="1400" i="1" dirty="0">
               <a:solidFill>
                 <a:schemeClr val="bg1">
                   <a:lumMod val="50000"/>
@@ -7379,13 +7387,6 @@
   <p:clrMapOvr>
     <a:masterClrMapping/>
   </p:clrMapOvr>
-  <p:timing>
-    <p:tnLst>
-      <p:par>
-        <p:cTn id="1" dur="indefinite" restart="never" nodeType="tmRoot"/>
-      </p:par>
-    </p:tnLst>
-  </p:timing>
 </p:sld>
 </file>
 
@@ -7422,10 +7423,9 @@
           <a:lstStyle/>
           <a:p>
             <a:r>
-              <a:rPr lang="en-US" dirty="0" smtClean="0"/>
+              <a:rPr lang="en-US" dirty="0"/>
               <a:t>Need to Analyze the Data</a:t>
             </a:r>
-            <a:endParaRPr lang="en-US" dirty="0"/>
           </a:p>
         </p:txBody>
       </p:sp>
@@ -7452,10 +7452,9 @@
           <a:lstStyle/>
           <a:p>
             <a:r>
-              <a:rPr lang="en-US" dirty="0" smtClean="0"/>
+              <a:rPr lang="en-US" dirty="0"/>
               <a:t>2002</a:t>
             </a:r>
-            <a:endParaRPr lang="en-US" dirty="0"/>
           </a:p>
         </p:txBody>
       </p:sp>
@@ -7523,136 +7522,56 @@
           <a:lstStyle/>
           <a:p>
             <a:r>
-              <a:rPr lang="en-US" sz="1400" dirty="0" smtClean="0">
+              <a:rPr lang="en-US" sz="1400" dirty="0">
                 <a:solidFill>
                   <a:schemeClr val="bg1">
                     <a:lumMod val="50000"/>
                   </a:schemeClr>
                 </a:solidFill>
               </a:rPr>
-              <a:t>“Engineering </a:t>
-            </a:r>
-            <a:r>
-              <a:rPr lang="en-US" sz="1400" dirty="0">
+              <a:t>“Engineering and Algorithm Design for an Image Processing API: A Technical Report on ITK - the Insight Toolkit”, T. S. </a:t>
+            </a:r>
+            <a:r>
+              <a:rPr lang="en-US" sz="1400" dirty="0" err="1">
                 <a:solidFill>
                   <a:schemeClr val="bg1">
                     <a:lumMod val="50000"/>
                   </a:schemeClr>
                 </a:solidFill>
               </a:rPr>
-              <a:t>and </a:t>
-            </a:r>
-            <a:r>
-              <a:rPr lang="en-US" sz="1400" dirty="0" smtClean="0">
+              <a:t>Yoo</a:t>
+            </a:r>
+            <a:r>
+              <a:rPr lang="en-US" sz="1400" dirty="0">
                 <a:solidFill>
                   <a:schemeClr val="bg1">
                     <a:lumMod val="50000"/>
                   </a:schemeClr>
                 </a:solidFill>
               </a:rPr>
-              <a:t>Algorithm Design </a:t>
-            </a:r>
-            <a:r>
-              <a:rPr lang="en-US" sz="1400" dirty="0">
+              <a:t> et al., </a:t>
+            </a:r>
+            <a:r>
+              <a:rPr lang="en-US" sz="1400" i="1" dirty="0">
                 <a:solidFill>
                   <a:schemeClr val="bg1">
                     <a:lumMod val="50000"/>
                   </a:schemeClr>
                 </a:solidFill>
               </a:rPr>
-              <a:t>for an Image Processing API: A Technical Report on ITK - the Insight </a:t>
-            </a:r>
-            <a:r>
-              <a:rPr lang="en-US" sz="1400" dirty="0" smtClean="0">
+              <a:t>Stud. Health Technol.  Inform.</a:t>
+            </a:r>
+            <a:r>
+              <a:rPr lang="en-US" sz="1400" dirty="0">
                 <a:solidFill>
                   <a:schemeClr val="bg1">
                     <a:lumMod val="50000"/>
                   </a:schemeClr>
                 </a:solidFill>
               </a:rPr>
-              <a:t>Toolkit”, </a:t>
-            </a:r>
-            <a:r>
-              <a:rPr lang="en-US" sz="1400" dirty="0">
-                <a:solidFill>
-                  <a:schemeClr val="bg1">
-                    <a:lumMod val="50000"/>
-                  </a:schemeClr>
-                </a:solidFill>
-              </a:rPr>
-              <a:t>T. S</a:t>
-            </a:r>
-            <a:r>
-              <a:rPr lang="en-US" sz="1400" dirty="0" smtClean="0">
-                <a:solidFill>
-                  <a:schemeClr val="bg1">
-                    <a:lumMod val="50000"/>
-                  </a:schemeClr>
-                </a:solidFill>
-              </a:rPr>
-              <a:t>. </a:t>
-            </a:r>
-            <a:r>
-              <a:rPr lang="en-US" sz="1400" dirty="0" err="1" smtClean="0">
-                <a:solidFill>
-                  <a:schemeClr val="bg1">
-                    <a:lumMod val="50000"/>
-                  </a:schemeClr>
-                </a:solidFill>
-              </a:rPr>
-              <a:t>Yoo</a:t>
-            </a:r>
-            <a:r>
-              <a:rPr lang="en-US" sz="1400" dirty="0" smtClean="0">
-                <a:solidFill>
-                  <a:schemeClr val="bg1">
-                    <a:lumMod val="50000"/>
-                  </a:schemeClr>
-                </a:solidFill>
-              </a:rPr>
-              <a:t> et al., </a:t>
-            </a:r>
-            <a:r>
-              <a:rPr lang="en-US" sz="1400" i="1" dirty="0" smtClean="0">
-                <a:solidFill>
-                  <a:schemeClr val="bg1">
-                    <a:lumMod val="50000"/>
-                  </a:schemeClr>
-                </a:solidFill>
-              </a:rPr>
-              <a:t>Stud. Health </a:t>
-            </a:r>
-            <a:r>
-              <a:rPr lang="en-US" sz="1400" i="1" dirty="0">
-                <a:solidFill>
-                  <a:schemeClr val="bg1">
-                    <a:lumMod val="50000"/>
-                  </a:schemeClr>
-                </a:solidFill>
-              </a:rPr>
-              <a:t>Technol.  Inform</a:t>
-            </a:r>
-            <a:r>
-              <a:rPr lang="en-US" sz="1400" i="1" dirty="0" smtClean="0">
-                <a:solidFill>
-                  <a:schemeClr val="bg1">
-                    <a:lumMod val="50000"/>
-                  </a:schemeClr>
-                </a:solidFill>
-              </a:rPr>
-              <a:t>.</a:t>
-            </a:r>
-            <a:r>
-              <a:rPr lang="en-US" sz="1400" dirty="0" smtClean="0">
-                <a:solidFill>
-                  <a:schemeClr val="bg1">
-                    <a:lumMod val="50000"/>
-                  </a:schemeClr>
-                </a:solidFill>
-              </a:rPr>
               <a:t>, 85, pp. 586-592, 2002.</a:t>
             </a:r>
-            <a:endParaRPr lang="en-US" sz="1400" i="1" dirty="0" smtClean="0">
+            <a:endParaRPr lang="en-US" sz="1400" i="1" dirty="0">
               <a:solidFill>
                 <a:schemeClr val="bg1">
                   <a:lumMod val="50000"/>
@@ -7705,13 +7624,6 @@
   <p:clrMapOvr>
     <a:masterClrMapping/>
   </p:clrMapOvr>
-  <p:timing>
-    <p:tnLst>
-      <p:par>
-        <p:cTn id="1" dur="indefinite" restart="never" nodeType="tmRoot"/>
-      </p:par>
-    </p:tnLst>
-  </p:timing>
 </p:sld>
 </file>
 
@@ -7748,10 +7660,9 @@
           <a:lstStyle/>
           <a:p>
             <a:r>
-              <a:rPr lang="en-US" dirty="0" smtClean="0"/>
+              <a:rPr lang="en-US" dirty="0"/>
               <a:t>Open Source</a:t>
             </a:r>
-            <a:endParaRPr lang="en-US" dirty="0"/>
           </a:p>
         </p:txBody>
       </p:sp>
@@ -8199,13 +8110,6 @@
   <p:clrMapOvr>
     <a:masterClrMapping/>
   </p:clrMapOvr>
-  <p:timing>
-    <p:tnLst>
-      <p:par>
-        <p:cTn id="1" dur="indefinite" restart="never" nodeType="tmRoot"/>
-      </p:par>
-    </p:tnLst>
-  </p:timing>
 </p:sld>
 </file>
 
@@ -8242,10 +8146,9 @@
           <a:lstStyle/>
           <a:p>
             <a:r>
-              <a:rPr lang="en-US" dirty="0" smtClean="0"/>
+              <a:rPr lang="en-US" dirty="0"/>
               <a:t>Commercial Entities</a:t>
             </a:r>
-            <a:endParaRPr lang="en-US" dirty="0"/>
           </a:p>
         </p:txBody>
       </p:sp>
@@ -8273,7 +8176,7 @@
           <a:p>
             <a:pPr algn="ctr"/>
             <a:r>
-              <a:rPr lang="en-US" sz="2400" dirty="0" smtClean="0">
+              <a:rPr lang="en-US" sz="2400" dirty="0">
                 <a:solidFill>
                   <a:srgbClr val="FF0000"/>
                 </a:solidFill>
@@ -8289,21 +8192,8 @@
                   <a:srgbClr val="FF0000"/>
                 </a:solidFill>
               </a:rPr>
-              <a:t>B</a:t>
-            </a:r>
-            <a:r>
-              <a:rPr lang="en-US" sz="2400" dirty="0" smtClean="0">
-                <a:solidFill>
-                  <a:srgbClr val="FF0000"/>
-                </a:solidFill>
-              </a:rPr>
-              <a:t>ut we have no written testimony.</a:t>
-            </a:r>
-            <a:endParaRPr lang="en-US" sz="2400" dirty="0">
-              <a:solidFill>
-                <a:srgbClr val="FF0000"/>
-              </a:solidFill>
-            </a:endParaRPr>
+              <a:t>But we have no written testimony.</a:t>
+            </a:r>
           </a:p>
         </p:txBody>
       </p:sp>
@@ -8577,13 +8467,6 @@
   <p:clrMapOvr>
     <a:masterClrMapping/>
   </p:clrMapOvr>
-  <p:timing>
-    <p:tnLst>
-      <p:par>
-        <p:cTn id="1" dur="indefinite" restart="never" nodeType="tmRoot"/>
-      </p:par>
-    </p:tnLst>
-  </p:timing>
 </p:sld>
 </file>
 
@@ -8620,11 +8503,11 @@
           <a:lstStyle/>
           <a:p>
             <a:r>
-              <a:rPr lang="en-US" dirty="0" smtClean="0"/>
+              <a:rPr lang="en-US" dirty="0"/>
               <a:t>Why </a:t>
             </a:r>
             <a:r>
-              <a:rPr lang="en-US" dirty="0" err="1" smtClean="0"/>
+              <a:rPr lang="en-US" dirty="0" err="1"/>
               <a:t>SimpleITK</a:t>
             </a:r>
             <a:endParaRPr lang="en-US" dirty="0"/>
@@ -8647,14 +8530,14 @@
           <a:lstStyle/>
           <a:p>
             <a:r>
-              <a:rPr lang="en-US" sz="2400" dirty="0" smtClean="0"/>
+              <a:rPr lang="en-US" sz="2400" dirty="0"/>
               <a:t>Change in programming expertise: </a:t>
             </a:r>
           </a:p>
           <a:p>
             <a:pPr lvl="1"/>
             <a:r>
-              <a:rPr lang="en-US" sz="2000" dirty="0" smtClean="0"/>
+              <a:rPr lang="en-US" sz="2000" dirty="0"/>
               <a:t>Shift from C++ to Python and R.</a:t>
             </a:r>
           </a:p>
@@ -8662,11 +8545,11 @@
             <a:pPr marL="457200" lvl="1" indent="0">
               <a:buNone/>
             </a:pPr>
-            <a:endParaRPr lang="en-US" sz="2000" dirty="0" smtClean="0"/>
-          </a:p>
-          <a:p>
-            <a:r>
-              <a:rPr lang="en-US" sz="2400" dirty="0" smtClean="0"/>
+            <a:endParaRPr lang="en-US" sz="2000" dirty="0"/>
+          </a:p>
+          <a:p>
+            <a:r>
+              <a:rPr lang="en-US" sz="2400" dirty="0"/>
               <a:t>Change in expectations:</a:t>
             </a:r>
           </a:p>
@@ -8696,13 +8579,6 @@
   <p:clrMapOvr>
     <a:masterClrMapping/>
   </p:clrMapOvr>
-  <p:timing>
-    <p:tnLst>
-      <p:par>
-        <p:cTn id="1" dur="indefinite" restart="never" nodeType="tmRoot"/>
-      </p:par>
-    </p:tnLst>
-  </p:timing>
 </p:sld>
 </file>
 
@@ -8739,14 +8615,13 @@
           <a:lstStyle/>
           <a:p>
             <a:r>
-              <a:rPr lang="en-US" dirty="0" err="1" smtClean="0"/>
+              <a:rPr lang="en-US" dirty="0" err="1"/>
               <a:t>SimpleITK</a:t>
             </a:r>
             <a:r>
-              <a:rPr lang="en-US" dirty="0" smtClean="0"/>
+              <a:rPr lang="en-US" dirty="0"/>
               <a:t> by the Numbers</a:t>
             </a:r>
-            <a:endParaRPr lang="en-US" dirty="0"/>
           </a:p>
         </p:txBody>
       </p:sp>
@@ -8766,73 +8641,73 @@
           <a:lstStyle/>
           <a:p>
             <a:r>
-              <a:rPr lang="en-US" sz="2800" dirty="0" smtClean="0"/>
+              <a:rPr lang="en-US" sz="2800" dirty="0"/>
               <a:t>17 Minor releases, 1 Major release.</a:t>
             </a:r>
           </a:p>
           <a:p>
-            <a:endParaRPr lang="en-US" sz="1600" dirty="0" smtClean="0"/>
-          </a:p>
-          <a:p>
-            <a:r>
-              <a:rPr lang="en-US" sz="2800" dirty="0" smtClean="0"/>
+            <a:endParaRPr lang="en-US" sz="1600" dirty="0"/>
+          </a:p>
+          <a:p>
+            <a:r>
+              <a:rPr lang="en-US" sz="2800" dirty="0"/>
               <a:t>25 Contributors.</a:t>
             </a:r>
           </a:p>
           <a:p>
-            <a:endParaRPr lang="en-US" sz="1600" dirty="0" smtClean="0"/>
-          </a:p>
-          <a:p>
-            <a:r>
-              <a:rPr lang="uk-UA" sz="2800" dirty="0" smtClean="0"/>
+            <a:endParaRPr lang="en-US" sz="1600" dirty="0"/>
+          </a:p>
+          <a:p>
+            <a:r>
+              <a:rPr lang="uk-UA" sz="2800" dirty="0"/>
               <a:t>9396</a:t>
             </a:r>
             <a:r>
-              <a:rPr lang="en-US" sz="2800" dirty="0" smtClean="0"/>
+              <a:rPr lang="en-US" sz="2800" dirty="0"/>
               <a:t> Commits.</a:t>
             </a:r>
           </a:p>
           <a:p>
-            <a:endParaRPr lang="fi-FI" sz="1600" dirty="0" smtClean="0"/>
-          </a:p>
-          <a:p>
-            <a:r>
-              <a:rPr lang="fi-FI" sz="2800" dirty="0" smtClean="0"/>
+            <a:endParaRPr lang="fi-FI" sz="1600" dirty="0"/>
+          </a:p>
+          <a:p>
+            <a:r>
+              <a:rPr lang="fi-FI" sz="2800" dirty="0"/>
               <a:t>191,718 </a:t>
             </a:r>
             <a:r>
-              <a:rPr lang="fi-FI" sz="2800" dirty="0" err="1" smtClean="0"/>
+              <a:rPr lang="fi-FI" sz="2800" dirty="0" err="1"/>
               <a:t>lines</a:t>
             </a:r>
             <a:r>
-              <a:rPr lang="fi-FI" sz="2800" dirty="0" smtClean="0"/>
+              <a:rPr lang="fi-FI" sz="2800" dirty="0"/>
               <a:t> of </a:t>
             </a:r>
             <a:r>
-              <a:rPr lang="fi-FI" sz="2800" dirty="0" err="1" smtClean="0"/>
+              <a:rPr lang="fi-FI" sz="2800" dirty="0" err="1"/>
               <a:t>code</a:t>
             </a:r>
             <a:r>
-              <a:rPr lang="fi-FI" sz="2800" dirty="0" smtClean="0"/>
+              <a:rPr lang="fi-FI" sz="2800" dirty="0"/>
               <a:t>.</a:t>
             </a:r>
           </a:p>
           <a:p>
-            <a:endParaRPr lang="fi-FI" sz="1600" dirty="0" smtClean="0"/>
-          </a:p>
-          <a:p>
-            <a:r>
-              <a:rPr lang="fi-FI" sz="2800" dirty="0" smtClean="0"/>
+            <a:endParaRPr lang="fi-FI" sz="1600" dirty="0"/>
+          </a:p>
+          <a:p>
+            <a:r>
+              <a:rPr lang="fi-FI" sz="2800" dirty="0"/>
               <a:t>Starred 154 times on github.</a:t>
             </a:r>
-            <a:endParaRPr lang="en-US" sz="2800" dirty="0" smtClean="0"/>
-          </a:p>
-          <a:p>
-            <a:endParaRPr lang="en-US" sz="1600" dirty="0" smtClean="0"/>
-          </a:p>
-          <a:p>
-            <a:r>
-              <a:rPr lang="en-US" sz="2800" dirty="0" smtClean="0"/>
+            <a:endParaRPr lang="en-US" sz="2800" dirty="0"/>
+          </a:p>
+          <a:p>
+            <a:endParaRPr lang="en-US" sz="1600" dirty="0"/>
+          </a:p>
+          <a:p>
+            <a:r>
+              <a:rPr lang="en-US" sz="2800" dirty="0"/>
               <a:t>More than 68,500 downloads since 1/2013.</a:t>
             </a:r>
           </a:p>

</xml_diff>